<commit_message>
Add comment. Adjust slide
</commit_message>
<xml_diff>
--- a/DataScience.pptx
+++ b/DataScience.pptx
@@ -21,6 +21,7 @@
     <p:sldId id="271" r:id="rId18"/>
     <p:sldId id="270" r:id="rId19"/>
     <p:sldId id="272" r:id="rId20"/>
+    <p:sldId id="273" r:id="rId21"/>
   </p:sldIdLst>
   <p:sldSz cx="12192000" cy="6858000"/>
   <p:notesSz cx="6858000" cy="9144000"/>
@@ -882,6 +883,788 @@
 </dgm:colorsDef>
 </file>
 
+<file path=ppt/diagrams/colors2.xml><?xml version="1.0" encoding="utf-8"?>
+<dgm:colorsDef xmlns:dgm="http://schemas.openxmlformats.org/drawingml/2006/diagram" xmlns:a="http://schemas.openxmlformats.org/drawingml/2006/main" uniqueId="urn:microsoft.com/office/officeart/2005/8/colors/colorful2">
+  <dgm:title val=""/>
+  <dgm:desc val=""/>
+  <dgm:catLst>
+    <dgm:cat type="colorful" pri="10200"/>
+  </dgm:catLst>
+  <dgm:styleLbl name="node0">
+    <dgm:fillClrLst meth="repeat">
+      <a:schemeClr val="accent1"/>
+    </dgm:fillClrLst>
+    <dgm:linClrLst meth="repeat">
+      <a:schemeClr val="lt1"/>
+    </dgm:linClrLst>
+    <dgm:effectClrLst/>
+    <dgm:txLinClrLst/>
+    <dgm:txFillClrLst/>
+    <dgm:txEffectClrLst/>
+  </dgm:styleLbl>
+  <dgm:styleLbl name="node1">
+    <dgm:fillClrLst>
+      <a:schemeClr val="accent2"/>
+      <a:schemeClr val="accent3"/>
+    </dgm:fillClrLst>
+    <dgm:linClrLst meth="repeat">
+      <a:schemeClr val="lt1"/>
+    </dgm:linClrLst>
+    <dgm:effectClrLst/>
+    <dgm:txLinClrLst/>
+    <dgm:txFillClrLst/>
+    <dgm:txEffectClrLst/>
+  </dgm:styleLbl>
+  <dgm:styleLbl name="alignNode1">
+    <dgm:fillClrLst>
+      <a:schemeClr val="accent2"/>
+      <a:schemeClr val="accent3"/>
+    </dgm:fillClrLst>
+    <dgm:linClrLst>
+      <a:schemeClr val="accent2"/>
+      <a:schemeClr val="accent3"/>
+    </dgm:linClrLst>
+    <dgm:effectClrLst/>
+    <dgm:txLinClrLst/>
+    <dgm:txFillClrLst/>
+    <dgm:txEffectClrLst/>
+  </dgm:styleLbl>
+  <dgm:styleLbl name="lnNode1">
+    <dgm:fillClrLst>
+      <a:schemeClr val="accent2"/>
+      <a:schemeClr val="accent3"/>
+    </dgm:fillClrLst>
+    <dgm:linClrLst meth="repeat">
+      <a:schemeClr val="lt1"/>
+    </dgm:linClrLst>
+    <dgm:effectClrLst/>
+    <dgm:txLinClrLst/>
+    <dgm:txFillClrLst/>
+    <dgm:txEffectClrLst/>
+  </dgm:styleLbl>
+  <dgm:styleLbl name="vennNode1">
+    <dgm:fillClrLst>
+      <a:schemeClr val="accent2">
+        <a:alpha val="50000"/>
+      </a:schemeClr>
+      <a:schemeClr val="accent3">
+        <a:alpha val="50000"/>
+      </a:schemeClr>
+    </dgm:fillClrLst>
+    <dgm:linClrLst meth="repeat">
+      <a:schemeClr val="lt1"/>
+    </dgm:linClrLst>
+    <dgm:effectClrLst/>
+    <dgm:txLinClrLst/>
+    <dgm:txFillClrLst/>
+    <dgm:txEffectClrLst/>
+  </dgm:styleLbl>
+  <dgm:styleLbl name="node2">
+    <dgm:fillClrLst>
+      <a:schemeClr val="accent3"/>
+    </dgm:fillClrLst>
+    <dgm:linClrLst meth="repeat">
+      <a:schemeClr val="lt1"/>
+    </dgm:linClrLst>
+    <dgm:effectClrLst/>
+    <dgm:txLinClrLst/>
+    <dgm:txFillClrLst/>
+    <dgm:txEffectClrLst/>
+  </dgm:styleLbl>
+  <dgm:styleLbl name="node3">
+    <dgm:fillClrLst>
+      <a:schemeClr val="accent4"/>
+    </dgm:fillClrLst>
+    <dgm:linClrLst meth="repeat">
+      <a:schemeClr val="lt1"/>
+    </dgm:linClrLst>
+    <dgm:effectClrLst/>
+    <dgm:txLinClrLst/>
+    <dgm:txFillClrLst/>
+    <dgm:txEffectClrLst/>
+  </dgm:styleLbl>
+  <dgm:styleLbl name="node4">
+    <dgm:fillClrLst>
+      <a:schemeClr val="accent5"/>
+    </dgm:fillClrLst>
+    <dgm:linClrLst meth="repeat">
+      <a:schemeClr val="lt1"/>
+    </dgm:linClrLst>
+    <dgm:effectClrLst/>
+    <dgm:txLinClrLst/>
+    <dgm:txFillClrLst/>
+    <dgm:txEffectClrLst/>
+  </dgm:styleLbl>
+  <dgm:styleLbl name="fgImgPlace1">
+    <dgm:fillClrLst>
+      <a:schemeClr val="accent2">
+        <a:tint val="50000"/>
+      </a:schemeClr>
+      <a:schemeClr val="accent3">
+        <a:tint val="50000"/>
+      </a:schemeClr>
+    </dgm:fillClrLst>
+    <dgm:linClrLst meth="repeat">
+      <a:schemeClr val="lt1"/>
+    </dgm:linClrLst>
+    <dgm:effectClrLst/>
+    <dgm:txLinClrLst/>
+    <dgm:txFillClrLst meth="repeat">
+      <a:schemeClr val="lt1"/>
+    </dgm:txFillClrLst>
+    <dgm:txEffectClrLst/>
+  </dgm:styleLbl>
+  <dgm:styleLbl name="alignImgPlace1">
+    <dgm:fillClrLst>
+      <a:schemeClr val="accent2">
+        <a:tint val="50000"/>
+      </a:schemeClr>
+      <a:schemeClr val="accent3">
+        <a:tint val="20000"/>
+      </a:schemeClr>
+    </dgm:fillClrLst>
+    <dgm:linClrLst meth="repeat">
+      <a:schemeClr val="lt1"/>
+    </dgm:linClrLst>
+    <dgm:effectClrLst/>
+    <dgm:txLinClrLst/>
+    <dgm:txFillClrLst meth="repeat">
+      <a:schemeClr val="lt1"/>
+    </dgm:txFillClrLst>
+    <dgm:txEffectClrLst/>
+  </dgm:styleLbl>
+  <dgm:styleLbl name="bgImgPlace1">
+    <dgm:fillClrLst>
+      <a:schemeClr val="accent2">
+        <a:tint val="50000"/>
+      </a:schemeClr>
+      <a:schemeClr val="accent3">
+        <a:tint val="20000"/>
+      </a:schemeClr>
+    </dgm:fillClrLst>
+    <dgm:linClrLst meth="repeat">
+      <a:schemeClr val="lt1"/>
+    </dgm:linClrLst>
+    <dgm:effectClrLst/>
+    <dgm:txLinClrLst/>
+    <dgm:txFillClrLst meth="repeat">
+      <a:schemeClr val="lt1"/>
+    </dgm:txFillClrLst>
+    <dgm:txEffectClrLst/>
+  </dgm:styleLbl>
+  <dgm:styleLbl name="sibTrans2D1">
+    <dgm:fillClrLst>
+      <a:schemeClr val="accent2"/>
+      <a:schemeClr val="accent3"/>
+    </dgm:fillClrLst>
+    <dgm:linClrLst meth="repeat">
+      <a:schemeClr val="lt1"/>
+    </dgm:linClrLst>
+    <dgm:effectClrLst/>
+    <dgm:txLinClrLst/>
+    <dgm:txFillClrLst/>
+    <dgm:txEffectClrLst/>
+  </dgm:styleLbl>
+  <dgm:styleLbl name="fgSibTrans2D1">
+    <dgm:fillClrLst>
+      <a:schemeClr val="accent2"/>
+      <a:schemeClr val="accent3"/>
+    </dgm:fillClrLst>
+    <dgm:linClrLst meth="repeat">
+      <a:schemeClr val="lt1"/>
+    </dgm:linClrLst>
+    <dgm:effectClrLst/>
+    <dgm:txLinClrLst/>
+    <dgm:txFillClrLst meth="repeat">
+      <a:schemeClr val="lt1"/>
+    </dgm:txFillClrLst>
+    <dgm:txEffectClrLst/>
+  </dgm:styleLbl>
+  <dgm:styleLbl name="bgSibTrans2D1">
+    <dgm:fillClrLst>
+      <a:schemeClr val="accent2"/>
+      <a:schemeClr val="accent3"/>
+    </dgm:fillClrLst>
+    <dgm:linClrLst meth="repeat">
+      <a:schemeClr val="lt1"/>
+    </dgm:linClrLst>
+    <dgm:effectClrLst/>
+    <dgm:txLinClrLst/>
+    <dgm:txFillClrLst meth="repeat">
+      <a:schemeClr val="lt1"/>
+    </dgm:txFillClrLst>
+    <dgm:txEffectClrLst/>
+  </dgm:styleLbl>
+  <dgm:styleLbl name="sibTrans1D1">
+    <dgm:fillClrLst/>
+    <dgm:linClrLst>
+      <a:schemeClr val="accent2"/>
+      <a:schemeClr val="accent3"/>
+    </dgm:linClrLst>
+    <dgm:effectClrLst/>
+    <dgm:txLinClrLst/>
+    <dgm:txFillClrLst meth="repeat">
+      <a:schemeClr val="tx1"/>
+    </dgm:txFillClrLst>
+    <dgm:txEffectClrLst/>
+  </dgm:styleLbl>
+  <dgm:styleLbl name="callout">
+    <dgm:fillClrLst meth="repeat">
+      <a:schemeClr val="accent2"/>
+    </dgm:fillClrLst>
+    <dgm:linClrLst meth="repeat">
+      <a:schemeClr val="accent2">
+        <a:tint val="50000"/>
+      </a:schemeClr>
+    </dgm:linClrLst>
+    <dgm:effectClrLst/>
+    <dgm:txLinClrLst/>
+    <dgm:txFillClrLst meth="repeat">
+      <a:schemeClr val="tx1"/>
+    </dgm:txFillClrLst>
+    <dgm:txEffectClrLst/>
+  </dgm:styleLbl>
+  <dgm:styleLbl name="asst0">
+    <dgm:fillClrLst meth="repeat">
+      <a:schemeClr val="accent2"/>
+    </dgm:fillClrLst>
+    <dgm:linClrLst meth="repeat">
+      <a:schemeClr val="lt1">
+        <a:shade val="80000"/>
+      </a:schemeClr>
+    </dgm:linClrLst>
+    <dgm:effectClrLst/>
+    <dgm:txLinClrLst/>
+    <dgm:txFillClrLst/>
+    <dgm:txEffectClrLst/>
+  </dgm:styleLbl>
+  <dgm:styleLbl name="asst1">
+    <dgm:fillClrLst meth="repeat">
+      <a:schemeClr val="accent3"/>
+    </dgm:fillClrLst>
+    <dgm:linClrLst meth="repeat">
+      <a:schemeClr val="lt1">
+        <a:shade val="80000"/>
+      </a:schemeClr>
+    </dgm:linClrLst>
+    <dgm:effectClrLst/>
+    <dgm:txLinClrLst/>
+    <dgm:txFillClrLst/>
+    <dgm:txEffectClrLst/>
+  </dgm:styleLbl>
+  <dgm:styleLbl name="asst2">
+    <dgm:fillClrLst>
+      <a:schemeClr val="accent4"/>
+    </dgm:fillClrLst>
+    <dgm:linClrLst meth="repeat">
+      <a:schemeClr val="lt1"/>
+    </dgm:linClrLst>
+    <dgm:effectClrLst/>
+    <dgm:txLinClrLst/>
+    <dgm:txFillClrLst/>
+    <dgm:txEffectClrLst/>
+  </dgm:styleLbl>
+  <dgm:styleLbl name="asst3">
+    <dgm:fillClrLst>
+      <a:schemeClr val="accent5"/>
+    </dgm:fillClrLst>
+    <dgm:linClrLst meth="repeat">
+      <a:schemeClr val="lt1"/>
+    </dgm:linClrLst>
+    <dgm:effectClrLst/>
+    <dgm:txLinClrLst/>
+    <dgm:txFillClrLst/>
+    <dgm:txEffectClrLst/>
+  </dgm:styleLbl>
+  <dgm:styleLbl name="asst4">
+    <dgm:fillClrLst>
+      <a:schemeClr val="accent6"/>
+    </dgm:fillClrLst>
+    <dgm:linClrLst meth="repeat">
+      <a:schemeClr val="lt1"/>
+    </dgm:linClrLst>
+    <dgm:effectClrLst/>
+    <dgm:txLinClrLst/>
+    <dgm:txFillClrLst/>
+    <dgm:txEffectClrLst/>
+  </dgm:styleLbl>
+  <dgm:styleLbl name="parChTrans2D1">
+    <dgm:fillClrLst meth="repeat">
+      <a:schemeClr val="accent2"/>
+    </dgm:fillClrLst>
+    <dgm:linClrLst meth="repeat">
+      <a:schemeClr val="lt1"/>
+    </dgm:linClrLst>
+    <dgm:effectClrLst/>
+    <dgm:txLinClrLst/>
+    <dgm:txFillClrLst meth="repeat">
+      <a:schemeClr val="lt1"/>
+    </dgm:txFillClrLst>
+    <dgm:txEffectClrLst/>
+  </dgm:styleLbl>
+  <dgm:styleLbl name="parChTrans2D2">
+    <dgm:fillClrLst meth="repeat">
+      <a:schemeClr val="accent3"/>
+    </dgm:fillClrLst>
+    <dgm:linClrLst meth="repeat">
+      <a:schemeClr val="lt1"/>
+    </dgm:linClrLst>
+    <dgm:effectClrLst/>
+    <dgm:txLinClrLst/>
+    <dgm:txFillClrLst/>
+    <dgm:txEffectClrLst/>
+  </dgm:styleLbl>
+  <dgm:styleLbl name="parChTrans2D3">
+    <dgm:fillClrLst meth="repeat">
+      <a:schemeClr val="accent4"/>
+    </dgm:fillClrLst>
+    <dgm:linClrLst meth="repeat">
+      <a:schemeClr val="lt1"/>
+    </dgm:linClrLst>
+    <dgm:effectClrLst/>
+    <dgm:txLinClrLst/>
+    <dgm:txFillClrLst/>
+    <dgm:txEffectClrLst/>
+  </dgm:styleLbl>
+  <dgm:styleLbl name="parChTrans2D4">
+    <dgm:fillClrLst meth="repeat">
+      <a:schemeClr val="accent5"/>
+    </dgm:fillClrLst>
+    <dgm:linClrLst meth="repeat">
+      <a:schemeClr val="lt1"/>
+    </dgm:linClrLst>
+    <dgm:effectClrLst/>
+    <dgm:txLinClrLst/>
+    <dgm:txFillClrLst meth="repeat">
+      <a:schemeClr val="lt1"/>
+    </dgm:txFillClrLst>
+    <dgm:txEffectClrLst/>
+  </dgm:styleLbl>
+  <dgm:styleLbl name="parChTrans1D1">
+    <dgm:fillClrLst meth="repeat">
+      <a:schemeClr val="accent2"/>
+    </dgm:fillClrLst>
+    <dgm:linClrLst meth="repeat">
+      <a:schemeClr val="accent2"/>
+    </dgm:linClrLst>
+    <dgm:effectClrLst/>
+    <dgm:txLinClrLst/>
+    <dgm:txFillClrLst meth="repeat">
+      <a:schemeClr val="tx1"/>
+    </dgm:txFillClrLst>
+    <dgm:txEffectClrLst/>
+  </dgm:styleLbl>
+  <dgm:styleLbl name="parChTrans1D2">
+    <dgm:fillClrLst meth="repeat">
+      <a:schemeClr val="accent2">
+        <a:tint val="90000"/>
+      </a:schemeClr>
+    </dgm:fillClrLst>
+    <dgm:linClrLst meth="repeat">
+      <a:schemeClr val="accent3"/>
+    </dgm:linClrLst>
+    <dgm:effectClrLst/>
+    <dgm:txLinClrLst/>
+    <dgm:txFillClrLst meth="repeat">
+      <a:schemeClr val="tx1"/>
+    </dgm:txFillClrLst>
+    <dgm:txEffectClrLst/>
+  </dgm:styleLbl>
+  <dgm:styleLbl name="parChTrans1D3">
+    <dgm:fillClrLst meth="repeat">
+      <a:schemeClr val="accent2">
+        <a:tint val="70000"/>
+      </a:schemeClr>
+    </dgm:fillClrLst>
+    <dgm:linClrLst meth="repeat">
+      <a:schemeClr val="accent4"/>
+    </dgm:linClrLst>
+    <dgm:effectClrLst/>
+    <dgm:txLinClrLst/>
+    <dgm:txFillClrLst meth="repeat">
+      <a:schemeClr val="tx1"/>
+    </dgm:txFillClrLst>
+    <dgm:txEffectClrLst/>
+  </dgm:styleLbl>
+  <dgm:styleLbl name="parChTrans1D4">
+    <dgm:fillClrLst meth="repeat">
+      <a:schemeClr val="accent2">
+        <a:tint val="50000"/>
+      </a:schemeClr>
+    </dgm:fillClrLst>
+    <dgm:linClrLst meth="repeat">
+      <a:schemeClr val="accent5"/>
+    </dgm:linClrLst>
+    <dgm:effectClrLst/>
+    <dgm:txLinClrLst/>
+    <dgm:txFillClrLst meth="repeat">
+      <a:schemeClr val="tx1"/>
+    </dgm:txFillClrLst>
+    <dgm:txEffectClrLst/>
+  </dgm:styleLbl>
+  <dgm:styleLbl name="fgAcc1">
+    <dgm:fillClrLst meth="repeat">
+      <a:schemeClr val="lt1">
+        <a:alpha val="90000"/>
+      </a:schemeClr>
+    </dgm:fillClrLst>
+    <dgm:linClrLst>
+      <a:schemeClr val="accent2"/>
+      <a:schemeClr val="accent3"/>
+    </dgm:linClrLst>
+    <dgm:effectClrLst/>
+    <dgm:txLinClrLst/>
+    <dgm:txFillClrLst meth="repeat">
+      <a:schemeClr val="dk1"/>
+    </dgm:txFillClrLst>
+    <dgm:txEffectClrLst/>
+  </dgm:styleLbl>
+  <dgm:styleLbl name="conFgAcc1">
+    <dgm:fillClrLst meth="repeat">
+      <a:schemeClr val="lt1">
+        <a:alpha val="90000"/>
+      </a:schemeClr>
+    </dgm:fillClrLst>
+    <dgm:linClrLst>
+      <a:schemeClr val="accent2"/>
+      <a:schemeClr val="accent3"/>
+    </dgm:linClrLst>
+    <dgm:effectClrLst/>
+    <dgm:txLinClrLst/>
+    <dgm:txFillClrLst meth="repeat">
+      <a:schemeClr val="dk1"/>
+    </dgm:txFillClrLst>
+    <dgm:txEffectClrLst/>
+  </dgm:styleLbl>
+  <dgm:styleLbl name="alignAcc1">
+    <dgm:fillClrLst meth="repeat">
+      <a:schemeClr val="lt1">
+        <a:alpha val="90000"/>
+      </a:schemeClr>
+    </dgm:fillClrLst>
+    <dgm:linClrLst>
+      <a:schemeClr val="accent2"/>
+      <a:schemeClr val="accent3"/>
+    </dgm:linClrLst>
+    <dgm:effectClrLst/>
+    <dgm:txLinClrLst/>
+    <dgm:txFillClrLst meth="repeat">
+      <a:schemeClr val="dk1"/>
+    </dgm:txFillClrLst>
+    <dgm:txEffectClrLst/>
+  </dgm:styleLbl>
+  <dgm:styleLbl name="trAlignAcc1">
+    <dgm:fillClrLst meth="repeat">
+      <a:schemeClr val="lt1">
+        <a:alpha val="40000"/>
+      </a:schemeClr>
+    </dgm:fillClrLst>
+    <dgm:linClrLst meth="repeat">
+      <a:schemeClr val="accent2"/>
+    </dgm:linClrLst>
+    <dgm:effectClrLst/>
+    <dgm:txLinClrLst/>
+    <dgm:txFillClrLst meth="repeat">
+      <a:schemeClr val="dk1"/>
+    </dgm:txFillClrLst>
+    <dgm:txEffectClrLst/>
+  </dgm:styleLbl>
+  <dgm:styleLbl name="bgAcc1">
+    <dgm:fillClrLst meth="repeat">
+      <a:schemeClr val="lt1">
+        <a:alpha val="90000"/>
+      </a:schemeClr>
+    </dgm:fillClrLst>
+    <dgm:linClrLst>
+      <a:schemeClr val="accent2"/>
+      <a:schemeClr val="accent3"/>
+    </dgm:linClrLst>
+    <dgm:effectClrLst/>
+    <dgm:txLinClrLst/>
+    <dgm:txFillClrLst meth="repeat">
+      <a:schemeClr val="dk1"/>
+    </dgm:txFillClrLst>
+    <dgm:txEffectClrLst/>
+  </dgm:styleLbl>
+  <dgm:styleLbl name="solidFgAcc1">
+    <dgm:fillClrLst meth="repeat">
+      <a:schemeClr val="lt1"/>
+    </dgm:fillClrLst>
+    <dgm:linClrLst>
+      <a:schemeClr val="accent2"/>
+      <a:schemeClr val="accent3"/>
+    </dgm:linClrLst>
+    <dgm:effectClrLst/>
+    <dgm:txLinClrLst/>
+    <dgm:txFillClrLst meth="repeat">
+      <a:schemeClr val="dk1"/>
+    </dgm:txFillClrLst>
+    <dgm:txEffectClrLst/>
+  </dgm:styleLbl>
+  <dgm:styleLbl name="solidAlignAcc1">
+    <dgm:fillClrLst meth="repeat">
+      <a:schemeClr val="lt1"/>
+    </dgm:fillClrLst>
+    <dgm:linClrLst>
+      <a:schemeClr val="accent2"/>
+      <a:schemeClr val="accent3"/>
+    </dgm:linClrLst>
+    <dgm:effectClrLst/>
+    <dgm:txLinClrLst/>
+    <dgm:txFillClrLst meth="repeat">
+      <a:schemeClr val="dk1"/>
+    </dgm:txFillClrLst>
+    <dgm:txEffectClrLst/>
+  </dgm:styleLbl>
+  <dgm:styleLbl name="solidBgAcc1">
+    <dgm:fillClrLst meth="repeat">
+      <a:schemeClr val="lt1"/>
+    </dgm:fillClrLst>
+    <dgm:linClrLst>
+      <a:schemeClr val="accent2"/>
+      <a:schemeClr val="accent3"/>
+    </dgm:linClrLst>
+    <dgm:effectClrLst/>
+    <dgm:txLinClrLst/>
+    <dgm:txFillClrLst meth="repeat">
+      <a:schemeClr val="dk1"/>
+    </dgm:txFillClrLst>
+    <dgm:txEffectClrLst/>
+  </dgm:styleLbl>
+  <dgm:styleLbl name="fgAccFollowNode1">
+    <dgm:fillClrLst>
+      <a:schemeClr val="accent2">
+        <a:tint val="40000"/>
+        <a:alpha val="90000"/>
+      </a:schemeClr>
+      <a:schemeClr val="accent3">
+        <a:tint val="40000"/>
+        <a:alpha val="90000"/>
+      </a:schemeClr>
+    </dgm:fillClrLst>
+    <dgm:linClrLst>
+      <a:schemeClr val="accent2">
+        <a:tint val="40000"/>
+        <a:alpha val="90000"/>
+      </a:schemeClr>
+      <a:schemeClr val="accent3">
+        <a:tint val="40000"/>
+        <a:alpha val="90000"/>
+      </a:schemeClr>
+    </dgm:linClrLst>
+    <dgm:effectClrLst/>
+    <dgm:txLinClrLst/>
+    <dgm:txFillClrLst meth="repeat">
+      <a:schemeClr val="dk1"/>
+    </dgm:txFillClrLst>
+    <dgm:txEffectClrLst/>
+  </dgm:styleLbl>
+  <dgm:styleLbl name="alignAccFollowNode1">
+    <dgm:fillClrLst>
+      <a:schemeClr val="accent2">
+        <a:tint val="40000"/>
+        <a:alpha val="90000"/>
+      </a:schemeClr>
+      <a:schemeClr val="accent3">
+        <a:tint val="40000"/>
+        <a:alpha val="90000"/>
+      </a:schemeClr>
+    </dgm:fillClrLst>
+    <dgm:linClrLst>
+      <a:schemeClr val="accent2">
+        <a:tint val="40000"/>
+        <a:alpha val="90000"/>
+      </a:schemeClr>
+      <a:schemeClr val="accent3">
+        <a:tint val="40000"/>
+        <a:alpha val="90000"/>
+      </a:schemeClr>
+    </dgm:linClrLst>
+    <dgm:effectClrLst/>
+    <dgm:txLinClrLst/>
+    <dgm:txFillClrLst meth="repeat">
+      <a:schemeClr val="dk1"/>
+    </dgm:txFillClrLst>
+    <dgm:txEffectClrLst/>
+  </dgm:styleLbl>
+  <dgm:styleLbl name="bgAccFollowNode1">
+    <dgm:fillClrLst>
+      <a:schemeClr val="accent2">
+        <a:tint val="40000"/>
+        <a:alpha val="90000"/>
+      </a:schemeClr>
+      <a:schemeClr val="accent3">
+        <a:tint val="40000"/>
+        <a:alpha val="90000"/>
+      </a:schemeClr>
+    </dgm:fillClrLst>
+    <dgm:linClrLst>
+      <a:schemeClr val="accent2">
+        <a:tint val="40000"/>
+        <a:alpha val="90000"/>
+      </a:schemeClr>
+      <a:schemeClr val="accent3">
+        <a:tint val="40000"/>
+        <a:alpha val="90000"/>
+      </a:schemeClr>
+    </dgm:linClrLst>
+    <dgm:effectClrLst/>
+    <dgm:txLinClrLst/>
+    <dgm:txFillClrLst meth="repeat">
+      <a:schemeClr val="dk1"/>
+    </dgm:txFillClrLst>
+    <dgm:txEffectClrLst/>
+  </dgm:styleLbl>
+  <dgm:styleLbl name="fgAcc0">
+    <dgm:fillClrLst meth="repeat">
+      <a:schemeClr val="lt1">
+        <a:alpha val="90000"/>
+      </a:schemeClr>
+    </dgm:fillClrLst>
+    <dgm:linClrLst>
+      <a:schemeClr val="accent1"/>
+    </dgm:linClrLst>
+    <dgm:effectClrLst/>
+    <dgm:txLinClrLst/>
+    <dgm:txFillClrLst meth="repeat">
+      <a:schemeClr val="dk1"/>
+    </dgm:txFillClrLst>
+    <dgm:txEffectClrLst/>
+  </dgm:styleLbl>
+  <dgm:styleLbl name="fgAcc2">
+    <dgm:fillClrLst meth="repeat">
+      <a:schemeClr val="lt1">
+        <a:alpha val="90000"/>
+      </a:schemeClr>
+    </dgm:fillClrLst>
+    <dgm:linClrLst>
+      <a:schemeClr val="accent3"/>
+    </dgm:linClrLst>
+    <dgm:effectClrLst/>
+    <dgm:txLinClrLst/>
+    <dgm:txFillClrLst meth="repeat">
+      <a:schemeClr val="dk1"/>
+    </dgm:txFillClrLst>
+    <dgm:txEffectClrLst/>
+  </dgm:styleLbl>
+  <dgm:styleLbl name="fgAcc3">
+    <dgm:fillClrLst meth="repeat">
+      <a:schemeClr val="lt1">
+        <a:alpha val="90000"/>
+      </a:schemeClr>
+    </dgm:fillClrLst>
+    <dgm:linClrLst>
+      <a:schemeClr val="accent4"/>
+    </dgm:linClrLst>
+    <dgm:effectClrLst/>
+    <dgm:txLinClrLst/>
+    <dgm:txFillClrLst meth="repeat">
+      <a:schemeClr val="dk1"/>
+    </dgm:txFillClrLst>
+    <dgm:txEffectClrLst/>
+  </dgm:styleLbl>
+  <dgm:styleLbl name="fgAcc4">
+    <dgm:fillClrLst meth="repeat">
+      <a:schemeClr val="lt1">
+        <a:alpha val="90000"/>
+      </a:schemeClr>
+    </dgm:fillClrLst>
+    <dgm:linClrLst>
+      <a:schemeClr val="accent5"/>
+    </dgm:linClrLst>
+    <dgm:effectClrLst/>
+    <dgm:txLinClrLst/>
+    <dgm:txFillClrLst meth="repeat">
+      <a:schemeClr val="dk1"/>
+    </dgm:txFillClrLst>
+    <dgm:txEffectClrLst/>
+  </dgm:styleLbl>
+  <dgm:styleLbl name="bgShp">
+    <dgm:fillClrLst meth="repeat">
+      <a:schemeClr val="accent2">
+        <a:tint val="40000"/>
+      </a:schemeClr>
+    </dgm:fillClrLst>
+    <dgm:linClrLst meth="repeat">
+      <a:schemeClr val="dk1"/>
+    </dgm:linClrLst>
+    <dgm:effectClrLst/>
+    <dgm:txLinClrLst/>
+    <dgm:txFillClrLst meth="repeat">
+      <a:schemeClr val="dk1"/>
+    </dgm:txFillClrLst>
+    <dgm:txEffectClrLst/>
+  </dgm:styleLbl>
+  <dgm:styleLbl name="dkBgShp">
+    <dgm:fillClrLst meth="repeat">
+      <a:schemeClr val="accent2">
+        <a:shade val="90000"/>
+      </a:schemeClr>
+    </dgm:fillClrLst>
+    <dgm:linClrLst meth="repeat">
+      <a:schemeClr val="dk1"/>
+    </dgm:linClrLst>
+    <dgm:effectClrLst/>
+    <dgm:txLinClrLst/>
+    <dgm:txFillClrLst meth="repeat">
+      <a:schemeClr val="lt1"/>
+    </dgm:txFillClrLst>
+    <dgm:txEffectClrLst/>
+  </dgm:styleLbl>
+  <dgm:styleLbl name="trBgShp">
+    <dgm:fillClrLst meth="repeat">
+      <a:schemeClr val="accent2">
+        <a:tint val="50000"/>
+        <a:alpha val="40000"/>
+      </a:schemeClr>
+    </dgm:fillClrLst>
+    <dgm:linClrLst meth="repeat">
+      <a:schemeClr val="accent2"/>
+    </dgm:linClrLst>
+    <dgm:effectClrLst/>
+    <dgm:txLinClrLst/>
+    <dgm:txFillClrLst meth="repeat">
+      <a:schemeClr val="lt1"/>
+    </dgm:txFillClrLst>
+    <dgm:txEffectClrLst/>
+  </dgm:styleLbl>
+  <dgm:styleLbl name="fgShp">
+    <dgm:fillClrLst meth="repeat">
+      <a:schemeClr val="accent2">
+        <a:tint val="40000"/>
+      </a:schemeClr>
+    </dgm:fillClrLst>
+    <dgm:linClrLst meth="repeat">
+      <a:schemeClr val="lt1"/>
+    </dgm:linClrLst>
+    <dgm:effectClrLst/>
+    <dgm:txLinClrLst/>
+    <dgm:txFillClrLst meth="repeat">
+      <a:schemeClr val="dk1"/>
+    </dgm:txFillClrLst>
+    <dgm:txEffectClrLst/>
+  </dgm:styleLbl>
+  <dgm:styleLbl name="revTx">
+    <dgm:fillClrLst meth="repeat">
+      <a:schemeClr val="lt1">
+        <a:alpha val="0"/>
+      </a:schemeClr>
+    </dgm:fillClrLst>
+    <dgm:linClrLst meth="repeat">
+      <a:schemeClr val="dk1">
+        <a:alpha val="0"/>
+      </a:schemeClr>
+    </dgm:linClrLst>
+    <dgm:effectClrLst/>
+    <dgm:txLinClrLst/>
+    <dgm:txFillClrLst meth="repeat">
+      <a:schemeClr val="tx1"/>
+    </dgm:txFillClrLst>
+    <dgm:txEffectClrLst/>
+  </dgm:styleLbl>
+</dgm:colorsDef>
+</file>
+
 <file path=ppt/diagrams/data1.xml><?xml version="1.0" encoding="utf-8"?>
 <dgm:dataModel xmlns:dgm="http://schemas.openxmlformats.org/drawingml/2006/diagram" xmlns:a="http://schemas.openxmlformats.org/drawingml/2006/main">
   <dgm:ptLst>
@@ -1501,6 +2284,387 @@
 </dgm:dataModel>
 </file>
 
+<file path=ppt/diagrams/data2.xml><?xml version="1.0" encoding="utf-8"?>
+<dgm:dataModel xmlns:dgm="http://schemas.openxmlformats.org/drawingml/2006/diagram" xmlns:a="http://schemas.openxmlformats.org/drawingml/2006/main">
+  <dgm:ptLst>
+    <dgm:pt modelId="{4A6D5FF3-BE5C-4B10-AEB8-DA6F06F573E7}" type="doc">
+      <dgm:prSet loTypeId="urn:microsoft.com/office/officeart/2005/8/layout/vList2" loCatId="list" qsTypeId="urn:microsoft.com/office/officeart/2005/8/quickstyle/simple1" qsCatId="simple" csTypeId="urn:microsoft.com/office/officeart/2005/8/colors/colorful2" csCatId="colorful"/>
+      <dgm:spPr/>
+      <dgm:t>
+        <a:bodyPr/>
+        <a:lstStyle/>
+        <a:p>
+          <a:endParaRPr lang="en-US"/>
+        </a:p>
+      </dgm:t>
+    </dgm:pt>
+    <dgm:pt modelId="{2FEDE8A1-17A9-49E6-B77B-4D6EF8D0B290}">
+      <dgm:prSet/>
+      <dgm:spPr/>
+      <dgm:t>
+        <a:bodyPr/>
+        <a:lstStyle/>
+        <a:p>
+          <a:r>
+            <a:rPr lang="en-US"/>
+            <a:t>Những gì đã học đ</a:t>
+          </a:r>
+          <a:r>
+            <a:rPr lang="vi-VN"/>
+            <a:t>ư</a:t>
+          </a:r>
+          <a:r>
+            <a:rPr lang="en-US"/>
+            <a:t>ợc:</a:t>
+          </a:r>
+        </a:p>
+      </dgm:t>
+    </dgm:pt>
+    <dgm:pt modelId="{E2E412E5-5BC0-4D32-B436-D48DD7975E58}" type="parTrans" cxnId="{4998AF96-A4ED-48E7-99C1-7165010DB742}">
+      <dgm:prSet/>
+      <dgm:spPr/>
+      <dgm:t>
+        <a:bodyPr/>
+        <a:lstStyle/>
+        <a:p>
+          <a:endParaRPr lang="en-US"/>
+        </a:p>
+      </dgm:t>
+    </dgm:pt>
+    <dgm:pt modelId="{64A15A60-94D5-4AD8-9B6C-75334C523635}" type="sibTrans" cxnId="{4998AF96-A4ED-48E7-99C1-7165010DB742}">
+      <dgm:prSet/>
+      <dgm:spPr/>
+      <dgm:t>
+        <a:bodyPr/>
+        <a:lstStyle/>
+        <a:p>
+          <a:endParaRPr lang="en-US"/>
+        </a:p>
+      </dgm:t>
+    </dgm:pt>
+    <dgm:pt modelId="{F963E08B-C207-40C4-A3C9-F0E0470038F6}">
+      <dgm:prSet/>
+      <dgm:spPr/>
+      <dgm:t>
+        <a:bodyPr/>
+        <a:lstStyle/>
+        <a:p>
+          <a:r>
+            <a:rPr lang="en-US"/>
+            <a:t>Xử lý âm thanh, áp dụng mô hình máy học vào bài toán nhận diện âm thanh.</a:t>
+          </a:r>
+        </a:p>
+      </dgm:t>
+    </dgm:pt>
+    <dgm:pt modelId="{2F0E9512-AD19-4A4D-B728-B89C7D21C37D}" type="parTrans" cxnId="{FC7AEF16-4ABC-4222-854A-57A631D59409}">
+      <dgm:prSet/>
+      <dgm:spPr/>
+      <dgm:t>
+        <a:bodyPr/>
+        <a:lstStyle/>
+        <a:p>
+          <a:endParaRPr lang="en-US"/>
+        </a:p>
+      </dgm:t>
+    </dgm:pt>
+    <dgm:pt modelId="{13C77393-DCD6-400C-A36F-B030E049FDB6}" type="sibTrans" cxnId="{FC7AEF16-4ABC-4222-854A-57A631D59409}">
+      <dgm:prSet/>
+      <dgm:spPr/>
+      <dgm:t>
+        <a:bodyPr/>
+        <a:lstStyle/>
+        <a:p>
+          <a:endParaRPr lang="en-US"/>
+        </a:p>
+      </dgm:t>
+    </dgm:pt>
+    <dgm:pt modelId="{74E7D5CD-8C5C-428E-BA10-7651647D2A12}">
+      <dgm:prSet/>
+      <dgm:spPr/>
+      <dgm:t>
+        <a:bodyPr/>
+        <a:lstStyle/>
+        <a:p>
+          <a:r>
+            <a:rPr lang="en-US"/>
+            <a:t>Đánh giá mô hình, fine-tuning kết quả để đạt đ</a:t>
+          </a:r>
+          <a:r>
+            <a:rPr lang="vi-VN"/>
+            <a:t>ư</a:t>
+          </a:r>
+          <a:r>
+            <a:rPr lang="en-US"/>
+            <a:t>ợc kết quả tốt.</a:t>
+          </a:r>
+        </a:p>
+      </dgm:t>
+    </dgm:pt>
+    <dgm:pt modelId="{5533C529-54B3-45C2-87C2-A31BD46E4248}" type="parTrans" cxnId="{D1E65F24-C336-4844-B2FA-AA1C7D19BA0B}">
+      <dgm:prSet/>
+      <dgm:spPr/>
+      <dgm:t>
+        <a:bodyPr/>
+        <a:lstStyle/>
+        <a:p>
+          <a:endParaRPr lang="en-US"/>
+        </a:p>
+      </dgm:t>
+    </dgm:pt>
+    <dgm:pt modelId="{38F686E2-37A5-4675-984A-E9E6BEE48C80}" type="sibTrans" cxnId="{D1E65F24-C336-4844-B2FA-AA1C7D19BA0B}">
+      <dgm:prSet/>
+      <dgm:spPr/>
+      <dgm:t>
+        <a:bodyPr/>
+        <a:lstStyle/>
+        <a:p>
+          <a:endParaRPr lang="en-US"/>
+        </a:p>
+      </dgm:t>
+    </dgm:pt>
+    <dgm:pt modelId="{490A6EAF-0FBD-40E7-B0F3-C9F08CE4011B}">
+      <dgm:prSet/>
+      <dgm:spPr/>
+      <dgm:t>
+        <a:bodyPr/>
+        <a:lstStyle/>
+        <a:p>
+          <a:r>
+            <a:rPr lang="en-US"/>
+            <a:t>Tăng c</a:t>
+          </a:r>
+          <a:r>
+            <a:rPr lang="vi-VN"/>
+            <a:t>ư</a:t>
+          </a:r>
+          <a:r>
+            <a:rPr lang="en-US"/>
+            <a:t>ờng dữ liệu với dữ liệu là âm thanh, thử nghiệm mô hình với điều kiện thực tế.</a:t>
+          </a:r>
+        </a:p>
+      </dgm:t>
+    </dgm:pt>
+    <dgm:pt modelId="{9C7B4F41-6D19-4F6A-983B-EEBA0DC87159}" type="parTrans" cxnId="{08DF1122-8801-4057-BE80-5292571C515D}">
+      <dgm:prSet/>
+      <dgm:spPr/>
+      <dgm:t>
+        <a:bodyPr/>
+        <a:lstStyle/>
+        <a:p>
+          <a:endParaRPr lang="en-US"/>
+        </a:p>
+      </dgm:t>
+    </dgm:pt>
+    <dgm:pt modelId="{D190DD4A-267C-40D4-9EDB-F46849F10EB4}" type="sibTrans" cxnId="{08DF1122-8801-4057-BE80-5292571C515D}">
+      <dgm:prSet/>
+      <dgm:spPr/>
+      <dgm:t>
+        <a:bodyPr/>
+        <a:lstStyle/>
+        <a:p>
+          <a:endParaRPr lang="en-US"/>
+        </a:p>
+      </dgm:t>
+    </dgm:pt>
+    <dgm:pt modelId="{7F79E7C3-79AB-4609-B53E-C24C1B237304}">
+      <dgm:prSet/>
+      <dgm:spPr/>
+      <dgm:t>
+        <a:bodyPr/>
+        <a:lstStyle/>
+        <a:p>
+          <a:r>
+            <a:rPr lang="en-US"/>
+            <a:t>Các h</a:t>
+          </a:r>
+          <a:r>
+            <a:rPr lang="vi-VN"/>
+            <a:t>ư</a:t>
+          </a:r>
+          <a:r>
+            <a:rPr lang="en-US"/>
+            <a:t>ớng mở rộng:</a:t>
+          </a:r>
+        </a:p>
+      </dgm:t>
+    </dgm:pt>
+    <dgm:pt modelId="{EDCAE6B6-EAEF-4C75-AFDC-77EE5DE524E9}" type="parTrans" cxnId="{50936ACC-00B1-43D1-8C0A-24F700754AFC}">
+      <dgm:prSet/>
+      <dgm:spPr/>
+      <dgm:t>
+        <a:bodyPr/>
+        <a:lstStyle/>
+        <a:p>
+          <a:endParaRPr lang="en-US"/>
+        </a:p>
+      </dgm:t>
+    </dgm:pt>
+    <dgm:pt modelId="{DE501A1D-8A41-4D40-8D0C-F086C08BCADF}" type="sibTrans" cxnId="{50936ACC-00B1-43D1-8C0A-24F700754AFC}">
+      <dgm:prSet/>
+      <dgm:spPr/>
+      <dgm:t>
+        <a:bodyPr/>
+        <a:lstStyle/>
+        <a:p>
+          <a:endParaRPr lang="en-US"/>
+        </a:p>
+      </dgm:t>
+    </dgm:pt>
+    <dgm:pt modelId="{3EF16817-23D9-42F2-93D4-3EB7DC584BB7}">
+      <dgm:prSet/>
+      <dgm:spPr/>
+      <dgm:t>
+        <a:bodyPr/>
+        <a:lstStyle/>
+        <a:p>
+          <a:r>
+            <a:rPr lang="en-US"/>
+            <a:t>Thử nghiệm các mô hình khác (CNN), thêm các lớp ẩn vào mô hình MLP</a:t>
+          </a:r>
+        </a:p>
+      </dgm:t>
+    </dgm:pt>
+    <dgm:pt modelId="{9F9B8160-2903-4678-87B7-92C79F0E53F1}" type="parTrans" cxnId="{DFB78992-4DC5-4B70-9F0A-AE0837DD3C2B}">
+      <dgm:prSet/>
+      <dgm:spPr/>
+      <dgm:t>
+        <a:bodyPr/>
+        <a:lstStyle/>
+        <a:p>
+          <a:endParaRPr lang="en-US"/>
+        </a:p>
+      </dgm:t>
+    </dgm:pt>
+    <dgm:pt modelId="{590953F2-E2C9-48D8-8F62-D5D82C1B988F}" type="sibTrans" cxnId="{DFB78992-4DC5-4B70-9F0A-AE0837DD3C2B}">
+      <dgm:prSet/>
+      <dgm:spPr/>
+      <dgm:t>
+        <a:bodyPr/>
+        <a:lstStyle/>
+        <a:p>
+          <a:endParaRPr lang="en-US"/>
+        </a:p>
+      </dgm:t>
+    </dgm:pt>
+    <dgm:pt modelId="{524C2491-BF16-4F61-AE5C-BEA7567A5E85}">
+      <dgm:prSet/>
+      <dgm:spPr/>
+      <dgm:t>
+        <a:bodyPr/>
+        <a:lstStyle/>
+        <a:p>
+          <a:r>
+            <a:rPr lang="en-US"/>
+            <a:t>Thêm các cách tăng c</a:t>
+          </a:r>
+          <a:r>
+            <a:rPr lang="vi-VN"/>
+            <a:t>ư</a:t>
+          </a:r>
+          <a:r>
+            <a:rPr lang="en-US"/>
+            <a:t>ờng dữ liệu khác (thay đổi tốc độ, shifting, stretching…)</a:t>
+          </a:r>
+        </a:p>
+      </dgm:t>
+    </dgm:pt>
+    <dgm:pt modelId="{04FEDDC6-E2CA-46E9-B821-7A859E79E5DA}" type="parTrans" cxnId="{69975804-1469-45D4-A9DA-C45895B247B2}">
+      <dgm:prSet/>
+      <dgm:spPr/>
+      <dgm:t>
+        <a:bodyPr/>
+        <a:lstStyle/>
+        <a:p>
+          <a:endParaRPr lang="en-US"/>
+        </a:p>
+      </dgm:t>
+    </dgm:pt>
+    <dgm:pt modelId="{8E84BDA2-EB15-4421-8CC4-AF2AC8A68F74}" type="sibTrans" cxnId="{69975804-1469-45D4-A9DA-C45895B247B2}">
+      <dgm:prSet/>
+      <dgm:spPr/>
+      <dgm:t>
+        <a:bodyPr/>
+        <a:lstStyle/>
+        <a:p>
+          <a:endParaRPr lang="en-US"/>
+        </a:p>
+      </dgm:t>
+    </dgm:pt>
+    <dgm:pt modelId="{BEE4BA9B-F197-4411-B218-6500700A86EE}" type="pres">
+      <dgm:prSet presAssocID="{4A6D5FF3-BE5C-4B10-AEB8-DA6F06F573E7}" presName="linear" presStyleCnt="0">
+        <dgm:presLayoutVars>
+          <dgm:animLvl val="lvl"/>
+          <dgm:resizeHandles val="exact"/>
+        </dgm:presLayoutVars>
+      </dgm:prSet>
+      <dgm:spPr/>
+    </dgm:pt>
+    <dgm:pt modelId="{70757870-350C-4A78-ACF8-8EFF0EC129D4}" type="pres">
+      <dgm:prSet presAssocID="{2FEDE8A1-17A9-49E6-B77B-4D6EF8D0B290}" presName="parentText" presStyleLbl="node1" presStyleIdx="0" presStyleCnt="2">
+        <dgm:presLayoutVars>
+          <dgm:chMax val="0"/>
+          <dgm:bulletEnabled val="1"/>
+        </dgm:presLayoutVars>
+      </dgm:prSet>
+      <dgm:spPr/>
+    </dgm:pt>
+    <dgm:pt modelId="{DEA5C809-D1BE-462D-A928-A43419E1FFD4}" type="pres">
+      <dgm:prSet presAssocID="{2FEDE8A1-17A9-49E6-B77B-4D6EF8D0B290}" presName="childText" presStyleLbl="revTx" presStyleIdx="0" presStyleCnt="2">
+        <dgm:presLayoutVars>
+          <dgm:bulletEnabled val="1"/>
+        </dgm:presLayoutVars>
+      </dgm:prSet>
+      <dgm:spPr/>
+    </dgm:pt>
+    <dgm:pt modelId="{F52A0E32-7AE7-4C60-9A49-2CEF9A171EF6}" type="pres">
+      <dgm:prSet presAssocID="{7F79E7C3-79AB-4609-B53E-C24C1B237304}" presName="parentText" presStyleLbl="node1" presStyleIdx="1" presStyleCnt="2">
+        <dgm:presLayoutVars>
+          <dgm:chMax val="0"/>
+          <dgm:bulletEnabled val="1"/>
+        </dgm:presLayoutVars>
+      </dgm:prSet>
+      <dgm:spPr/>
+    </dgm:pt>
+    <dgm:pt modelId="{8D59166F-EB5A-48BB-89FC-BFCAEDD33E43}" type="pres">
+      <dgm:prSet presAssocID="{7F79E7C3-79AB-4609-B53E-C24C1B237304}" presName="childText" presStyleLbl="revTx" presStyleIdx="1" presStyleCnt="2">
+        <dgm:presLayoutVars>
+          <dgm:bulletEnabled val="1"/>
+        </dgm:presLayoutVars>
+      </dgm:prSet>
+      <dgm:spPr/>
+    </dgm:pt>
+  </dgm:ptLst>
+  <dgm:cxnLst>
+    <dgm:cxn modelId="{69975804-1469-45D4-A9DA-C45895B247B2}" srcId="{7F79E7C3-79AB-4609-B53E-C24C1B237304}" destId="{524C2491-BF16-4F61-AE5C-BEA7567A5E85}" srcOrd="1" destOrd="0" parTransId="{04FEDDC6-E2CA-46E9-B821-7A859E79E5DA}" sibTransId="{8E84BDA2-EB15-4421-8CC4-AF2AC8A68F74}"/>
+    <dgm:cxn modelId="{FC7AEF16-4ABC-4222-854A-57A631D59409}" srcId="{2FEDE8A1-17A9-49E6-B77B-4D6EF8D0B290}" destId="{F963E08B-C207-40C4-A3C9-F0E0470038F6}" srcOrd="0" destOrd="0" parTransId="{2F0E9512-AD19-4A4D-B728-B89C7D21C37D}" sibTransId="{13C77393-DCD6-400C-A36F-B030E049FDB6}"/>
+    <dgm:cxn modelId="{08DF1122-8801-4057-BE80-5292571C515D}" srcId="{2FEDE8A1-17A9-49E6-B77B-4D6EF8D0B290}" destId="{490A6EAF-0FBD-40E7-B0F3-C9F08CE4011B}" srcOrd="2" destOrd="0" parTransId="{9C7B4F41-6D19-4F6A-983B-EEBA0DC87159}" sibTransId="{D190DD4A-267C-40D4-9EDB-F46849F10EB4}"/>
+    <dgm:cxn modelId="{D1E65F24-C336-4844-B2FA-AA1C7D19BA0B}" srcId="{2FEDE8A1-17A9-49E6-B77B-4D6EF8D0B290}" destId="{74E7D5CD-8C5C-428E-BA10-7651647D2A12}" srcOrd="1" destOrd="0" parTransId="{5533C529-54B3-45C2-87C2-A31BD46E4248}" sibTransId="{38F686E2-37A5-4675-984A-E9E6BEE48C80}"/>
+    <dgm:cxn modelId="{17394346-9A85-4644-A06E-B6F022FB6120}" type="presOf" srcId="{4A6D5FF3-BE5C-4B10-AEB8-DA6F06F573E7}" destId="{BEE4BA9B-F197-4411-B218-6500700A86EE}" srcOrd="0" destOrd="0" presId="urn:microsoft.com/office/officeart/2005/8/layout/vList2"/>
+    <dgm:cxn modelId="{A15FD88E-32DA-418A-AC36-0BD8B16B0E25}" type="presOf" srcId="{524C2491-BF16-4F61-AE5C-BEA7567A5E85}" destId="{8D59166F-EB5A-48BB-89FC-BFCAEDD33E43}" srcOrd="0" destOrd="1" presId="urn:microsoft.com/office/officeart/2005/8/layout/vList2"/>
+    <dgm:cxn modelId="{DFB78992-4DC5-4B70-9F0A-AE0837DD3C2B}" srcId="{7F79E7C3-79AB-4609-B53E-C24C1B237304}" destId="{3EF16817-23D9-42F2-93D4-3EB7DC584BB7}" srcOrd="0" destOrd="0" parTransId="{9F9B8160-2903-4678-87B7-92C79F0E53F1}" sibTransId="{590953F2-E2C9-48D8-8F62-D5D82C1B988F}"/>
+    <dgm:cxn modelId="{25607793-E660-4BAB-B4E5-26FB687B0346}" type="presOf" srcId="{74E7D5CD-8C5C-428E-BA10-7651647D2A12}" destId="{DEA5C809-D1BE-462D-A928-A43419E1FFD4}" srcOrd="0" destOrd="1" presId="urn:microsoft.com/office/officeart/2005/8/layout/vList2"/>
+    <dgm:cxn modelId="{4413EE95-62C0-410B-B2FF-A155FB84C1DC}" type="presOf" srcId="{2FEDE8A1-17A9-49E6-B77B-4D6EF8D0B290}" destId="{70757870-350C-4A78-ACF8-8EFF0EC129D4}" srcOrd="0" destOrd="0" presId="urn:microsoft.com/office/officeart/2005/8/layout/vList2"/>
+    <dgm:cxn modelId="{4998AF96-A4ED-48E7-99C1-7165010DB742}" srcId="{4A6D5FF3-BE5C-4B10-AEB8-DA6F06F573E7}" destId="{2FEDE8A1-17A9-49E6-B77B-4D6EF8D0B290}" srcOrd="0" destOrd="0" parTransId="{E2E412E5-5BC0-4D32-B436-D48DD7975E58}" sibTransId="{64A15A60-94D5-4AD8-9B6C-75334C523635}"/>
+    <dgm:cxn modelId="{09F319AB-A07D-4982-8397-EB7C2DFCB0A1}" type="presOf" srcId="{490A6EAF-0FBD-40E7-B0F3-C9F08CE4011B}" destId="{DEA5C809-D1BE-462D-A928-A43419E1FFD4}" srcOrd="0" destOrd="2" presId="urn:microsoft.com/office/officeart/2005/8/layout/vList2"/>
+    <dgm:cxn modelId="{14AB53BF-952B-46A2-9CE6-31EFDF9548CF}" type="presOf" srcId="{F963E08B-C207-40C4-A3C9-F0E0470038F6}" destId="{DEA5C809-D1BE-462D-A928-A43419E1FFD4}" srcOrd="0" destOrd="0" presId="urn:microsoft.com/office/officeart/2005/8/layout/vList2"/>
+    <dgm:cxn modelId="{50936ACC-00B1-43D1-8C0A-24F700754AFC}" srcId="{4A6D5FF3-BE5C-4B10-AEB8-DA6F06F573E7}" destId="{7F79E7C3-79AB-4609-B53E-C24C1B237304}" srcOrd="1" destOrd="0" parTransId="{EDCAE6B6-EAEF-4C75-AFDC-77EE5DE524E9}" sibTransId="{DE501A1D-8A41-4D40-8D0C-F086C08BCADF}"/>
+    <dgm:cxn modelId="{CBC178D2-0C99-431C-BD70-410066D4826D}" type="presOf" srcId="{3EF16817-23D9-42F2-93D4-3EB7DC584BB7}" destId="{8D59166F-EB5A-48BB-89FC-BFCAEDD33E43}" srcOrd="0" destOrd="0" presId="urn:microsoft.com/office/officeart/2005/8/layout/vList2"/>
+    <dgm:cxn modelId="{39001CFC-1E5E-43CE-9906-11F25DBFA102}" type="presOf" srcId="{7F79E7C3-79AB-4609-B53E-C24C1B237304}" destId="{F52A0E32-7AE7-4C60-9A49-2CEF9A171EF6}" srcOrd="0" destOrd="0" presId="urn:microsoft.com/office/officeart/2005/8/layout/vList2"/>
+    <dgm:cxn modelId="{2A444E29-7A2A-47F0-8887-B4AC184535FB}" type="presParOf" srcId="{BEE4BA9B-F197-4411-B218-6500700A86EE}" destId="{70757870-350C-4A78-ACF8-8EFF0EC129D4}" srcOrd="0" destOrd="0" presId="urn:microsoft.com/office/officeart/2005/8/layout/vList2"/>
+    <dgm:cxn modelId="{85D568CF-F697-4E0E-B3E5-A4042C21E161}" type="presParOf" srcId="{BEE4BA9B-F197-4411-B218-6500700A86EE}" destId="{DEA5C809-D1BE-462D-A928-A43419E1FFD4}" srcOrd="1" destOrd="0" presId="urn:microsoft.com/office/officeart/2005/8/layout/vList2"/>
+    <dgm:cxn modelId="{09E141DF-9267-42A7-8DC5-E73F37DE4096}" type="presParOf" srcId="{BEE4BA9B-F197-4411-B218-6500700A86EE}" destId="{F52A0E32-7AE7-4C60-9A49-2CEF9A171EF6}" srcOrd="2" destOrd="0" presId="urn:microsoft.com/office/officeart/2005/8/layout/vList2"/>
+    <dgm:cxn modelId="{CA81B7C5-4229-4EF7-9C20-B747E80433BC}" type="presParOf" srcId="{BEE4BA9B-F197-4411-B218-6500700A86EE}" destId="{8D59166F-EB5A-48BB-89FC-BFCAEDD33E43}" srcOrd="3" destOrd="0" presId="urn:microsoft.com/office/officeart/2005/8/layout/vList2"/>
+  </dgm:cxnLst>
+  <dgm:bg/>
+  <dgm:whole/>
+  <dgm:extLst>
+    <a:ext uri="http://schemas.microsoft.com/office/drawing/2008/diagram">
+      <dsp:dataModelExt xmlns:dsp="http://schemas.microsoft.com/office/drawing/2008/diagram" relId="rId6" minVer="http://schemas.openxmlformats.org/drawingml/2006/diagram"/>
+    </a:ext>
+  </dgm:extLst>
+</dgm:dataModel>
+</file>
+
 <file path=ppt/diagrams/drawing1.xml><?xml version="1.0" encoding="utf-8"?>
 <dsp:drawing xmlns:dgm="http://schemas.openxmlformats.org/drawingml/2006/diagram" xmlns:dsp="http://schemas.microsoft.com/office/drawing/2008/diagram" xmlns:a="http://schemas.openxmlformats.org/drawingml/2006/main">
   <dsp:spTree>
@@ -2224,6 +3388,386 @@
       <dsp:txXfrm>
         <a:off x="2514599" y="1707"/>
         <a:ext cx="7543800" cy="1498823"/>
+      </dsp:txXfrm>
+    </dsp:sp>
+  </dsp:spTree>
+</dsp:drawing>
+</file>
+
+<file path=ppt/diagrams/drawing2.xml><?xml version="1.0" encoding="utf-8"?>
+<dsp:drawing xmlns:dgm="http://schemas.openxmlformats.org/drawingml/2006/diagram" xmlns:dsp="http://schemas.microsoft.com/office/drawing/2008/diagram" xmlns:a="http://schemas.openxmlformats.org/drawingml/2006/main">
+  <dsp:spTree>
+    <dsp:nvGrpSpPr>
+      <dsp:cNvPr id="0" name=""/>
+      <dsp:cNvGrpSpPr/>
+    </dsp:nvGrpSpPr>
+    <dsp:grpSpPr/>
+    <dsp:sp modelId="{70757870-350C-4A78-ACF8-8EFF0EC129D4}">
+      <dsp:nvSpPr>
+        <dsp:cNvPr id="0" name=""/>
+        <dsp:cNvSpPr/>
+      </dsp:nvSpPr>
+      <dsp:spPr>
+        <a:xfrm>
+          <a:off x="0" y="86795"/>
+          <a:ext cx="6797675" cy="767520"/>
+        </a:xfrm>
+        <a:prstGeom prst="roundRect">
+          <a:avLst/>
+        </a:prstGeom>
+        <a:solidFill>
+          <a:schemeClr val="accent2">
+            <a:hueOff val="0"/>
+            <a:satOff val="0"/>
+            <a:lumOff val="0"/>
+            <a:alphaOff val="0"/>
+          </a:schemeClr>
+        </a:solidFill>
+        <a:ln w="15875" cap="flat" cmpd="sng" algn="ctr">
+          <a:solidFill>
+            <a:schemeClr val="lt1">
+              <a:hueOff val="0"/>
+              <a:satOff val="0"/>
+              <a:lumOff val="0"/>
+              <a:alphaOff val="0"/>
+            </a:schemeClr>
+          </a:solidFill>
+          <a:prstDash val="solid"/>
+        </a:ln>
+        <a:effectLst/>
+      </dsp:spPr>
+      <dsp:style>
+        <a:lnRef idx="2">
+          <a:scrgbClr r="0" g="0" b="0"/>
+        </a:lnRef>
+        <a:fillRef idx="1">
+          <a:scrgbClr r="0" g="0" b="0"/>
+        </a:fillRef>
+        <a:effectRef idx="0">
+          <a:scrgbClr r="0" g="0" b="0"/>
+        </a:effectRef>
+        <a:fontRef idx="minor">
+          <a:schemeClr val="lt1"/>
+        </a:fontRef>
+      </dsp:style>
+      <dsp:txBody>
+        <a:bodyPr spcFirstLastPara="0" vert="horz" wrap="square" lIns="121920" tIns="121920" rIns="121920" bIns="121920" numCol="1" spcCol="1270" anchor="ctr" anchorCtr="0">
+          <a:noAutofit/>
+        </a:bodyPr>
+        <a:lstStyle/>
+        <a:p>
+          <a:pPr marL="0" lvl="0" indent="0" algn="l" defTabSz="1422400">
+            <a:lnSpc>
+              <a:spcPct val="90000"/>
+            </a:lnSpc>
+            <a:spcBef>
+              <a:spcPct val="0"/>
+            </a:spcBef>
+            <a:spcAft>
+              <a:spcPct val="35000"/>
+            </a:spcAft>
+            <a:buNone/>
+          </a:pPr>
+          <a:r>
+            <a:rPr lang="en-US" sz="3200" kern="1200"/>
+            <a:t>Những gì đã học đ</a:t>
+          </a:r>
+          <a:r>
+            <a:rPr lang="vi-VN" sz="3200" kern="1200"/>
+            <a:t>ư</a:t>
+          </a:r>
+          <a:r>
+            <a:rPr lang="en-US" sz="3200" kern="1200"/>
+            <a:t>ợc:</a:t>
+          </a:r>
+        </a:p>
+      </dsp:txBody>
+      <dsp:txXfrm>
+        <a:off x="37467" y="124262"/>
+        <a:ext cx="6722741" cy="692586"/>
+      </dsp:txXfrm>
+    </dsp:sp>
+    <dsp:sp modelId="{DEA5C809-D1BE-462D-A928-A43419E1FFD4}">
+      <dsp:nvSpPr>
+        <dsp:cNvPr id="0" name=""/>
+        <dsp:cNvSpPr/>
+      </dsp:nvSpPr>
+      <dsp:spPr>
+        <a:xfrm>
+          <a:off x="0" y="854315"/>
+          <a:ext cx="6797675" cy="2384640"/>
+        </a:xfrm>
+        <a:prstGeom prst="rect">
+          <a:avLst/>
+        </a:prstGeom>
+        <a:noFill/>
+        <a:ln>
+          <a:noFill/>
+        </a:ln>
+        <a:effectLst/>
+      </dsp:spPr>
+      <dsp:style>
+        <a:lnRef idx="0">
+          <a:scrgbClr r="0" g="0" b="0"/>
+        </a:lnRef>
+        <a:fillRef idx="0">
+          <a:scrgbClr r="0" g="0" b="0"/>
+        </a:fillRef>
+        <a:effectRef idx="0">
+          <a:scrgbClr r="0" g="0" b="0"/>
+        </a:effectRef>
+        <a:fontRef idx="minor"/>
+      </dsp:style>
+      <dsp:txBody>
+        <a:bodyPr spcFirstLastPara="0" vert="horz" wrap="square" lIns="215826" tIns="40640" rIns="227584" bIns="40640" numCol="1" spcCol="1270" anchor="t" anchorCtr="0">
+          <a:noAutofit/>
+        </a:bodyPr>
+        <a:lstStyle/>
+        <a:p>
+          <a:pPr marL="228600" lvl="1" indent="-228600" algn="l" defTabSz="1111250">
+            <a:lnSpc>
+              <a:spcPct val="90000"/>
+            </a:lnSpc>
+            <a:spcBef>
+              <a:spcPct val="0"/>
+            </a:spcBef>
+            <a:spcAft>
+              <a:spcPct val="20000"/>
+            </a:spcAft>
+            <a:buChar char="•"/>
+          </a:pPr>
+          <a:r>
+            <a:rPr lang="en-US" sz="2500" kern="1200"/>
+            <a:t>Xử lý âm thanh, áp dụng mô hình máy học vào bài toán nhận diện âm thanh.</a:t>
+          </a:r>
+        </a:p>
+        <a:p>
+          <a:pPr marL="228600" lvl="1" indent="-228600" algn="l" defTabSz="1111250">
+            <a:lnSpc>
+              <a:spcPct val="90000"/>
+            </a:lnSpc>
+            <a:spcBef>
+              <a:spcPct val="0"/>
+            </a:spcBef>
+            <a:spcAft>
+              <a:spcPct val="20000"/>
+            </a:spcAft>
+            <a:buChar char="•"/>
+          </a:pPr>
+          <a:r>
+            <a:rPr lang="en-US" sz="2500" kern="1200"/>
+            <a:t>Đánh giá mô hình, fine-tuning kết quả để đạt đ</a:t>
+          </a:r>
+          <a:r>
+            <a:rPr lang="vi-VN" sz="2500" kern="1200"/>
+            <a:t>ư</a:t>
+          </a:r>
+          <a:r>
+            <a:rPr lang="en-US" sz="2500" kern="1200"/>
+            <a:t>ợc kết quả tốt.</a:t>
+          </a:r>
+        </a:p>
+        <a:p>
+          <a:pPr marL="228600" lvl="1" indent="-228600" algn="l" defTabSz="1111250">
+            <a:lnSpc>
+              <a:spcPct val="90000"/>
+            </a:lnSpc>
+            <a:spcBef>
+              <a:spcPct val="0"/>
+            </a:spcBef>
+            <a:spcAft>
+              <a:spcPct val="20000"/>
+            </a:spcAft>
+            <a:buChar char="•"/>
+          </a:pPr>
+          <a:r>
+            <a:rPr lang="en-US" sz="2500" kern="1200"/>
+            <a:t>Tăng c</a:t>
+          </a:r>
+          <a:r>
+            <a:rPr lang="vi-VN" sz="2500" kern="1200"/>
+            <a:t>ư</a:t>
+          </a:r>
+          <a:r>
+            <a:rPr lang="en-US" sz="2500" kern="1200"/>
+            <a:t>ờng dữ liệu với dữ liệu là âm thanh, thử nghiệm mô hình với điều kiện thực tế.</a:t>
+          </a:r>
+        </a:p>
+      </dsp:txBody>
+      <dsp:txXfrm>
+        <a:off x="0" y="854315"/>
+        <a:ext cx="6797675" cy="2384640"/>
+      </dsp:txXfrm>
+    </dsp:sp>
+    <dsp:sp modelId="{F52A0E32-7AE7-4C60-9A49-2CEF9A171EF6}">
+      <dsp:nvSpPr>
+        <dsp:cNvPr id="0" name=""/>
+        <dsp:cNvSpPr/>
+      </dsp:nvSpPr>
+      <dsp:spPr>
+        <a:xfrm>
+          <a:off x="0" y="3238956"/>
+          <a:ext cx="6797675" cy="767520"/>
+        </a:xfrm>
+        <a:prstGeom prst="roundRect">
+          <a:avLst/>
+        </a:prstGeom>
+        <a:solidFill>
+          <a:schemeClr val="accent2">
+            <a:hueOff val="39038"/>
+            <a:satOff val="-26876"/>
+            <a:lumOff val="-6863"/>
+            <a:alphaOff val="0"/>
+          </a:schemeClr>
+        </a:solidFill>
+        <a:ln w="15875" cap="flat" cmpd="sng" algn="ctr">
+          <a:solidFill>
+            <a:schemeClr val="lt1">
+              <a:hueOff val="0"/>
+              <a:satOff val="0"/>
+              <a:lumOff val="0"/>
+              <a:alphaOff val="0"/>
+            </a:schemeClr>
+          </a:solidFill>
+          <a:prstDash val="solid"/>
+        </a:ln>
+        <a:effectLst/>
+      </dsp:spPr>
+      <dsp:style>
+        <a:lnRef idx="2">
+          <a:scrgbClr r="0" g="0" b="0"/>
+        </a:lnRef>
+        <a:fillRef idx="1">
+          <a:scrgbClr r="0" g="0" b="0"/>
+        </a:fillRef>
+        <a:effectRef idx="0">
+          <a:scrgbClr r="0" g="0" b="0"/>
+        </a:effectRef>
+        <a:fontRef idx="minor">
+          <a:schemeClr val="lt1"/>
+        </a:fontRef>
+      </dsp:style>
+      <dsp:txBody>
+        <a:bodyPr spcFirstLastPara="0" vert="horz" wrap="square" lIns="121920" tIns="121920" rIns="121920" bIns="121920" numCol="1" spcCol="1270" anchor="ctr" anchorCtr="0">
+          <a:noAutofit/>
+        </a:bodyPr>
+        <a:lstStyle/>
+        <a:p>
+          <a:pPr marL="0" lvl="0" indent="0" algn="l" defTabSz="1422400">
+            <a:lnSpc>
+              <a:spcPct val="90000"/>
+            </a:lnSpc>
+            <a:spcBef>
+              <a:spcPct val="0"/>
+            </a:spcBef>
+            <a:spcAft>
+              <a:spcPct val="35000"/>
+            </a:spcAft>
+            <a:buNone/>
+          </a:pPr>
+          <a:r>
+            <a:rPr lang="en-US" sz="3200" kern="1200"/>
+            <a:t>Các h</a:t>
+          </a:r>
+          <a:r>
+            <a:rPr lang="vi-VN" sz="3200" kern="1200"/>
+            <a:t>ư</a:t>
+          </a:r>
+          <a:r>
+            <a:rPr lang="en-US" sz="3200" kern="1200"/>
+            <a:t>ớng mở rộng:</a:t>
+          </a:r>
+        </a:p>
+      </dsp:txBody>
+      <dsp:txXfrm>
+        <a:off x="37467" y="3276423"/>
+        <a:ext cx="6722741" cy="692586"/>
+      </dsp:txXfrm>
+    </dsp:sp>
+    <dsp:sp modelId="{8D59166F-EB5A-48BB-89FC-BFCAEDD33E43}">
+      <dsp:nvSpPr>
+        <dsp:cNvPr id="0" name=""/>
+        <dsp:cNvSpPr/>
+      </dsp:nvSpPr>
+      <dsp:spPr>
+        <a:xfrm>
+          <a:off x="0" y="4006476"/>
+          <a:ext cx="6797675" cy="1556640"/>
+        </a:xfrm>
+        <a:prstGeom prst="rect">
+          <a:avLst/>
+        </a:prstGeom>
+        <a:noFill/>
+        <a:ln>
+          <a:noFill/>
+        </a:ln>
+        <a:effectLst/>
+      </dsp:spPr>
+      <dsp:style>
+        <a:lnRef idx="0">
+          <a:scrgbClr r="0" g="0" b="0"/>
+        </a:lnRef>
+        <a:fillRef idx="0">
+          <a:scrgbClr r="0" g="0" b="0"/>
+        </a:fillRef>
+        <a:effectRef idx="0">
+          <a:scrgbClr r="0" g="0" b="0"/>
+        </a:effectRef>
+        <a:fontRef idx="minor"/>
+      </dsp:style>
+      <dsp:txBody>
+        <a:bodyPr spcFirstLastPara="0" vert="horz" wrap="square" lIns="215826" tIns="40640" rIns="227584" bIns="40640" numCol="1" spcCol="1270" anchor="t" anchorCtr="0">
+          <a:noAutofit/>
+        </a:bodyPr>
+        <a:lstStyle/>
+        <a:p>
+          <a:pPr marL="228600" lvl="1" indent="-228600" algn="l" defTabSz="1111250">
+            <a:lnSpc>
+              <a:spcPct val="90000"/>
+            </a:lnSpc>
+            <a:spcBef>
+              <a:spcPct val="0"/>
+            </a:spcBef>
+            <a:spcAft>
+              <a:spcPct val="20000"/>
+            </a:spcAft>
+            <a:buChar char="•"/>
+          </a:pPr>
+          <a:r>
+            <a:rPr lang="en-US" sz="2500" kern="1200"/>
+            <a:t>Thử nghiệm các mô hình khác (CNN), thêm các lớp ẩn vào mô hình MLP</a:t>
+          </a:r>
+        </a:p>
+        <a:p>
+          <a:pPr marL="228600" lvl="1" indent="-228600" algn="l" defTabSz="1111250">
+            <a:lnSpc>
+              <a:spcPct val="90000"/>
+            </a:lnSpc>
+            <a:spcBef>
+              <a:spcPct val="0"/>
+            </a:spcBef>
+            <a:spcAft>
+              <a:spcPct val="20000"/>
+            </a:spcAft>
+            <a:buChar char="•"/>
+          </a:pPr>
+          <a:r>
+            <a:rPr lang="en-US" sz="2500" kern="1200"/>
+            <a:t>Thêm các cách tăng c</a:t>
+          </a:r>
+          <a:r>
+            <a:rPr lang="vi-VN" sz="2500" kern="1200"/>
+            <a:t>ư</a:t>
+          </a:r>
+          <a:r>
+            <a:rPr lang="en-US" sz="2500" kern="1200"/>
+            <a:t>ờng dữ liệu khác (thay đổi tốc độ, shifting, stretching…)</a:t>
+          </a:r>
+        </a:p>
+      </dsp:txBody>
+      <dsp:txXfrm>
+        <a:off x="0" y="4006476"/>
+        <a:ext cx="6797675" cy="1556640"/>
       </dsp:txXfrm>
     </dsp:sp>
   </dsp:spTree>
@@ -2497,7 +4041,1208 @@
 </dgm:layoutDef>
 </file>
 
+<file path=ppt/diagrams/layout2.xml><?xml version="1.0" encoding="utf-8"?>
+<dgm:layoutDef xmlns:dgm="http://schemas.openxmlformats.org/drawingml/2006/diagram" xmlns:a="http://schemas.openxmlformats.org/drawingml/2006/main" uniqueId="urn:microsoft.com/office/officeart/2005/8/layout/vList2">
+  <dgm:title val=""/>
+  <dgm:desc val=""/>
+  <dgm:catLst>
+    <dgm:cat type="list" pri="3000"/>
+    <dgm:cat type="convert" pri="1000"/>
+  </dgm:catLst>
+  <dgm:sampData>
+    <dgm:dataModel>
+      <dgm:ptLst>
+        <dgm:pt modelId="0" type="doc"/>
+        <dgm:pt modelId="1">
+          <dgm:prSet phldr="1"/>
+        </dgm:pt>
+        <dgm:pt modelId="11">
+          <dgm:prSet phldr="1"/>
+        </dgm:pt>
+        <dgm:pt modelId="2">
+          <dgm:prSet phldr="1"/>
+        </dgm:pt>
+        <dgm:pt modelId="21">
+          <dgm:prSet phldr="1"/>
+        </dgm:pt>
+      </dgm:ptLst>
+      <dgm:cxnLst>
+        <dgm:cxn modelId="4" srcId="0" destId="1" srcOrd="0" destOrd="0"/>
+        <dgm:cxn modelId="5" srcId="0" destId="2" srcOrd="1" destOrd="0"/>
+        <dgm:cxn modelId="12" srcId="1" destId="11" srcOrd="0" destOrd="0"/>
+        <dgm:cxn modelId="23" srcId="2" destId="21" srcOrd="0" destOrd="0"/>
+      </dgm:cxnLst>
+      <dgm:bg/>
+      <dgm:whole/>
+    </dgm:dataModel>
+  </dgm:sampData>
+  <dgm:styleData>
+    <dgm:dataModel>
+      <dgm:ptLst>
+        <dgm:pt modelId="0" type="doc"/>
+        <dgm:pt modelId="1"/>
+        <dgm:pt modelId="2"/>
+      </dgm:ptLst>
+      <dgm:cxnLst>
+        <dgm:cxn modelId="3" srcId="0" destId="1" srcOrd="0" destOrd="0"/>
+        <dgm:cxn modelId="4" srcId="0" destId="2" srcOrd="1" destOrd="0"/>
+      </dgm:cxnLst>
+      <dgm:bg/>
+      <dgm:whole/>
+    </dgm:dataModel>
+  </dgm:styleData>
+  <dgm:clrData>
+    <dgm:dataModel>
+      <dgm:ptLst>
+        <dgm:pt modelId="0" type="doc"/>
+        <dgm:pt modelId="1"/>
+        <dgm:pt modelId="2"/>
+        <dgm:pt modelId="3"/>
+        <dgm:pt modelId="4"/>
+      </dgm:ptLst>
+      <dgm:cxnLst>
+        <dgm:cxn modelId="5" srcId="0" destId="1" srcOrd="0" destOrd="0"/>
+        <dgm:cxn modelId="6" srcId="0" destId="2" srcOrd="1" destOrd="0"/>
+        <dgm:cxn modelId="7" srcId="0" destId="3" srcOrd="2" destOrd="0"/>
+        <dgm:cxn modelId="8" srcId="0" destId="4" srcOrd="3" destOrd="0"/>
+      </dgm:cxnLst>
+      <dgm:bg/>
+      <dgm:whole/>
+    </dgm:dataModel>
+  </dgm:clrData>
+  <dgm:layoutNode name="linear">
+    <dgm:varLst>
+      <dgm:animLvl val="lvl"/>
+      <dgm:resizeHandles val="exact"/>
+    </dgm:varLst>
+    <dgm:alg type="lin">
+      <dgm:param type="linDir" val="fromT"/>
+      <dgm:param type="vertAlign" val="mid"/>
+    </dgm:alg>
+    <dgm:shape xmlns:r="http://schemas.openxmlformats.org/officeDocument/2006/relationships" r:blip="">
+      <dgm:adjLst/>
+    </dgm:shape>
+    <dgm:presOf/>
+    <dgm:constrLst>
+      <dgm:constr type="w" for="ch" forName="parentText" refType="w"/>
+      <dgm:constr type="h" for="ch" forName="parentText" refType="primFontSz" refFor="ch" refForName="parentText" fact="0.52"/>
+      <dgm:constr type="w" for="ch" forName="childText" refType="w"/>
+      <dgm:constr type="h" for="ch" forName="childText" refType="primFontSz" refFor="ch" refForName="parentText" fact="0.46"/>
+      <dgm:constr type="h" for="ch" forName="parentText" op="equ"/>
+      <dgm:constr type="primFontSz" for="ch" forName="parentText" op="equ" val="65"/>
+      <dgm:constr type="primFontSz" for="ch" forName="childText" refType="primFontSz" refFor="ch" refForName="parentText" op="equ"/>
+      <dgm:constr type="h" for="ch" forName="spacer" refType="primFontSz" refFor="ch" refForName="parentText" fact="0.08"/>
+    </dgm:constrLst>
+    <dgm:ruleLst>
+      <dgm:rule type="primFontSz" for="ch" forName="parentText" val="5" fact="NaN" max="NaN"/>
+    </dgm:ruleLst>
+    <dgm:forEach name="Name0" axis="ch" ptType="node">
+      <dgm:layoutNode name="parentText" styleLbl="node1">
+        <dgm:varLst>
+          <dgm:chMax val="0"/>
+          <dgm:bulletEnabled val="1"/>
+        </dgm:varLst>
+        <dgm:alg type="tx">
+          <dgm:param type="parTxLTRAlign" val="l"/>
+          <dgm:param type="parTxRTLAlign" val="r"/>
+        </dgm:alg>
+        <dgm:shape xmlns:r="http://schemas.openxmlformats.org/officeDocument/2006/relationships" type="roundRect" r:blip="">
+          <dgm:adjLst/>
+        </dgm:shape>
+        <dgm:presOf axis="self"/>
+        <dgm:constrLst>
+          <dgm:constr type="tMarg" refType="primFontSz" fact="0.3"/>
+          <dgm:constr type="bMarg" refType="primFontSz" fact="0.3"/>
+          <dgm:constr type="lMarg" refType="primFontSz" fact="0.3"/>
+          <dgm:constr type="rMarg" refType="primFontSz" fact="0.3"/>
+        </dgm:constrLst>
+        <dgm:ruleLst>
+          <dgm:rule type="h" val="INF" fact="NaN" max="NaN"/>
+        </dgm:ruleLst>
+      </dgm:layoutNode>
+      <dgm:choose name="Name1">
+        <dgm:if name="Name2" axis="ch" ptType="node" func="cnt" op="gte" val="1">
+          <dgm:layoutNode name="childText" styleLbl="revTx">
+            <dgm:varLst>
+              <dgm:bulletEnabled val="1"/>
+            </dgm:varLst>
+            <dgm:alg type="tx">
+              <dgm:param type="stBulletLvl" val="1"/>
+              <dgm:param type="lnSpAfChP" val="20"/>
+            </dgm:alg>
+            <dgm:shape xmlns:r="http://schemas.openxmlformats.org/officeDocument/2006/relationships" type="rect" r:blip="">
+              <dgm:adjLst/>
+            </dgm:shape>
+            <dgm:presOf axis="des" ptType="node"/>
+            <dgm:constrLst>
+              <dgm:constr type="tMarg" refType="primFontSz" fact="0.1"/>
+              <dgm:constr type="bMarg" refType="primFontSz" fact="0.1"/>
+              <dgm:constr type="lMarg" refType="w" fact="0.09"/>
+            </dgm:constrLst>
+            <dgm:ruleLst>
+              <dgm:rule type="h" val="INF" fact="NaN" max="NaN"/>
+            </dgm:ruleLst>
+          </dgm:layoutNode>
+        </dgm:if>
+        <dgm:else name="Name3">
+          <dgm:choose name="Name4">
+            <dgm:if name="Name5" axis="par ch" ptType="doc node" func="cnt" op="gte" val="2">
+              <dgm:forEach name="Name6" axis="followSib" ptType="sibTrans" cnt="1">
+                <dgm:layoutNode name="spacer">
+                  <dgm:alg type="sp"/>
+                  <dgm:shape xmlns:r="http://schemas.openxmlformats.org/officeDocument/2006/relationships" r:blip="">
+                    <dgm:adjLst/>
+                  </dgm:shape>
+                  <dgm:presOf/>
+                  <dgm:constrLst/>
+                  <dgm:ruleLst/>
+                </dgm:layoutNode>
+              </dgm:forEach>
+            </dgm:if>
+            <dgm:else name="Name7"/>
+          </dgm:choose>
+        </dgm:else>
+      </dgm:choose>
+    </dgm:forEach>
+  </dgm:layoutNode>
+</dgm:layoutDef>
+</file>
+
 <file path=ppt/diagrams/quickStyle1.xml><?xml version="1.0" encoding="utf-8"?>
+<dgm:styleDef xmlns:dgm="http://schemas.openxmlformats.org/drawingml/2006/diagram" xmlns:a="http://schemas.openxmlformats.org/drawingml/2006/main" uniqueId="urn:microsoft.com/office/officeart/2005/8/quickstyle/simple1">
+  <dgm:title val=""/>
+  <dgm:desc val=""/>
+  <dgm:catLst>
+    <dgm:cat type="simple" pri="10100"/>
+  </dgm:catLst>
+  <dgm:scene3d>
+    <a:camera prst="orthographicFront"/>
+    <a:lightRig rig="threePt" dir="t"/>
+  </dgm:scene3d>
+  <dgm:styleLbl name="node0">
+    <dgm:scene3d>
+      <a:camera prst="orthographicFront"/>
+      <a:lightRig rig="threePt" dir="t"/>
+    </dgm:scene3d>
+    <dgm:sp3d/>
+    <dgm:txPr/>
+    <dgm:style>
+      <a:lnRef idx="2">
+        <a:scrgbClr r="0" g="0" b="0"/>
+      </a:lnRef>
+      <a:fillRef idx="1">
+        <a:scrgbClr r="0" g="0" b="0"/>
+      </a:fillRef>
+      <a:effectRef idx="0">
+        <a:scrgbClr r="0" g="0" b="0"/>
+      </a:effectRef>
+      <a:fontRef idx="minor">
+        <a:schemeClr val="lt1"/>
+      </a:fontRef>
+    </dgm:style>
+  </dgm:styleLbl>
+  <dgm:styleLbl name="lnNode1">
+    <dgm:scene3d>
+      <a:camera prst="orthographicFront"/>
+      <a:lightRig rig="threePt" dir="t"/>
+    </dgm:scene3d>
+    <dgm:sp3d/>
+    <dgm:txPr/>
+    <dgm:style>
+      <a:lnRef idx="2">
+        <a:scrgbClr r="0" g="0" b="0"/>
+      </a:lnRef>
+      <a:fillRef idx="1">
+        <a:scrgbClr r="0" g="0" b="0"/>
+      </a:fillRef>
+      <a:effectRef idx="0">
+        <a:scrgbClr r="0" g="0" b="0"/>
+      </a:effectRef>
+      <a:fontRef idx="minor">
+        <a:schemeClr val="lt1"/>
+      </a:fontRef>
+    </dgm:style>
+  </dgm:styleLbl>
+  <dgm:styleLbl name="vennNode1">
+    <dgm:scene3d>
+      <a:camera prst="orthographicFront"/>
+      <a:lightRig rig="threePt" dir="t"/>
+    </dgm:scene3d>
+    <dgm:sp3d/>
+    <dgm:txPr/>
+    <dgm:style>
+      <a:lnRef idx="2">
+        <a:scrgbClr r="0" g="0" b="0"/>
+      </a:lnRef>
+      <a:fillRef idx="1">
+        <a:scrgbClr r="0" g="0" b="0"/>
+      </a:fillRef>
+      <a:effectRef idx="0">
+        <a:scrgbClr r="0" g="0" b="0"/>
+      </a:effectRef>
+      <a:fontRef idx="minor">
+        <a:schemeClr val="tx1"/>
+      </a:fontRef>
+    </dgm:style>
+  </dgm:styleLbl>
+  <dgm:styleLbl name="alignNode1">
+    <dgm:scene3d>
+      <a:camera prst="orthographicFront"/>
+      <a:lightRig rig="threePt" dir="t"/>
+    </dgm:scene3d>
+    <dgm:sp3d/>
+    <dgm:txPr/>
+    <dgm:style>
+      <a:lnRef idx="2">
+        <a:scrgbClr r="0" g="0" b="0"/>
+      </a:lnRef>
+      <a:fillRef idx="1">
+        <a:scrgbClr r="0" g="0" b="0"/>
+      </a:fillRef>
+      <a:effectRef idx="0">
+        <a:scrgbClr r="0" g="0" b="0"/>
+      </a:effectRef>
+      <a:fontRef idx="minor">
+        <a:schemeClr val="lt1"/>
+      </a:fontRef>
+    </dgm:style>
+  </dgm:styleLbl>
+  <dgm:styleLbl name="node1">
+    <dgm:scene3d>
+      <a:camera prst="orthographicFront"/>
+      <a:lightRig rig="threePt" dir="t"/>
+    </dgm:scene3d>
+    <dgm:sp3d/>
+    <dgm:txPr/>
+    <dgm:style>
+      <a:lnRef idx="2">
+        <a:scrgbClr r="0" g="0" b="0"/>
+      </a:lnRef>
+      <a:fillRef idx="1">
+        <a:scrgbClr r="0" g="0" b="0"/>
+      </a:fillRef>
+      <a:effectRef idx="0">
+        <a:scrgbClr r="0" g="0" b="0"/>
+      </a:effectRef>
+      <a:fontRef idx="minor">
+        <a:schemeClr val="lt1"/>
+      </a:fontRef>
+    </dgm:style>
+  </dgm:styleLbl>
+  <dgm:styleLbl name="node2">
+    <dgm:scene3d>
+      <a:camera prst="orthographicFront"/>
+      <a:lightRig rig="threePt" dir="t"/>
+    </dgm:scene3d>
+    <dgm:sp3d/>
+    <dgm:txPr/>
+    <dgm:style>
+      <a:lnRef idx="2">
+        <a:scrgbClr r="0" g="0" b="0"/>
+      </a:lnRef>
+      <a:fillRef idx="1">
+        <a:scrgbClr r="0" g="0" b="0"/>
+      </a:fillRef>
+      <a:effectRef idx="0">
+        <a:scrgbClr r="0" g="0" b="0"/>
+      </a:effectRef>
+      <a:fontRef idx="minor">
+        <a:schemeClr val="lt1"/>
+      </a:fontRef>
+    </dgm:style>
+  </dgm:styleLbl>
+  <dgm:styleLbl name="node3">
+    <dgm:scene3d>
+      <a:camera prst="orthographicFront"/>
+      <a:lightRig rig="threePt" dir="t"/>
+    </dgm:scene3d>
+    <dgm:sp3d/>
+    <dgm:txPr/>
+    <dgm:style>
+      <a:lnRef idx="2">
+        <a:scrgbClr r="0" g="0" b="0"/>
+      </a:lnRef>
+      <a:fillRef idx="1">
+        <a:scrgbClr r="0" g="0" b="0"/>
+      </a:fillRef>
+      <a:effectRef idx="0">
+        <a:scrgbClr r="0" g="0" b="0"/>
+      </a:effectRef>
+      <a:fontRef idx="minor">
+        <a:schemeClr val="lt1"/>
+      </a:fontRef>
+    </dgm:style>
+  </dgm:styleLbl>
+  <dgm:styleLbl name="node4">
+    <dgm:scene3d>
+      <a:camera prst="orthographicFront"/>
+      <a:lightRig rig="threePt" dir="t"/>
+    </dgm:scene3d>
+    <dgm:sp3d/>
+    <dgm:txPr/>
+    <dgm:style>
+      <a:lnRef idx="2">
+        <a:scrgbClr r="0" g="0" b="0"/>
+      </a:lnRef>
+      <a:fillRef idx="1">
+        <a:scrgbClr r="0" g="0" b="0"/>
+      </a:fillRef>
+      <a:effectRef idx="0">
+        <a:scrgbClr r="0" g="0" b="0"/>
+      </a:effectRef>
+      <a:fontRef idx="minor">
+        <a:schemeClr val="lt1"/>
+      </a:fontRef>
+    </dgm:style>
+  </dgm:styleLbl>
+  <dgm:styleLbl name="fgImgPlace1">
+    <dgm:scene3d>
+      <a:camera prst="orthographicFront"/>
+      <a:lightRig rig="threePt" dir="t"/>
+    </dgm:scene3d>
+    <dgm:sp3d/>
+    <dgm:txPr/>
+    <dgm:style>
+      <a:lnRef idx="2">
+        <a:scrgbClr r="0" g="0" b="0"/>
+      </a:lnRef>
+      <a:fillRef idx="1">
+        <a:scrgbClr r="0" g="0" b="0"/>
+      </a:fillRef>
+      <a:effectRef idx="0">
+        <a:scrgbClr r="0" g="0" b="0"/>
+      </a:effectRef>
+      <a:fontRef idx="minor"/>
+    </dgm:style>
+  </dgm:styleLbl>
+  <dgm:styleLbl name="alignImgPlace1">
+    <dgm:scene3d>
+      <a:camera prst="orthographicFront"/>
+      <a:lightRig rig="threePt" dir="t"/>
+    </dgm:scene3d>
+    <dgm:sp3d/>
+    <dgm:txPr/>
+    <dgm:style>
+      <a:lnRef idx="2">
+        <a:scrgbClr r="0" g="0" b="0"/>
+      </a:lnRef>
+      <a:fillRef idx="1">
+        <a:scrgbClr r="0" g="0" b="0"/>
+      </a:fillRef>
+      <a:effectRef idx="0">
+        <a:scrgbClr r="0" g="0" b="0"/>
+      </a:effectRef>
+      <a:fontRef idx="minor"/>
+    </dgm:style>
+  </dgm:styleLbl>
+  <dgm:styleLbl name="bgImgPlace1">
+    <dgm:scene3d>
+      <a:camera prst="orthographicFront"/>
+      <a:lightRig rig="threePt" dir="t"/>
+    </dgm:scene3d>
+    <dgm:sp3d/>
+    <dgm:txPr/>
+    <dgm:style>
+      <a:lnRef idx="2">
+        <a:scrgbClr r="0" g="0" b="0"/>
+      </a:lnRef>
+      <a:fillRef idx="1">
+        <a:scrgbClr r="0" g="0" b="0"/>
+      </a:fillRef>
+      <a:effectRef idx="0">
+        <a:scrgbClr r="0" g="0" b="0"/>
+      </a:effectRef>
+      <a:fontRef idx="minor"/>
+    </dgm:style>
+  </dgm:styleLbl>
+  <dgm:styleLbl name="sibTrans2D1">
+    <dgm:scene3d>
+      <a:camera prst="orthographicFront"/>
+      <a:lightRig rig="threePt" dir="t"/>
+    </dgm:scene3d>
+    <dgm:sp3d/>
+    <dgm:txPr/>
+    <dgm:style>
+      <a:lnRef idx="0">
+        <a:scrgbClr r="0" g="0" b="0"/>
+      </a:lnRef>
+      <a:fillRef idx="1">
+        <a:scrgbClr r="0" g="0" b="0"/>
+      </a:fillRef>
+      <a:effectRef idx="0">
+        <a:scrgbClr r="0" g="0" b="0"/>
+      </a:effectRef>
+      <a:fontRef idx="minor">
+        <a:schemeClr val="lt1"/>
+      </a:fontRef>
+    </dgm:style>
+  </dgm:styleLbl>
+  <dgm:styleLbl name="fgSibTrans2D1">
+    <dgm:scene3d>
+      <a:camera prst="orthographicFront"/>
+      <a:lightRig rig="threePt" dir="t"/>
+    </dgm:scene3d>
+    <dgm:sp3d/>
+    <dgm:txPr/>
+    <dgm:style>
+      <a:lnRef idx="0">
+        <a:scrgbClr r="0" g="0" b="0"/>
+      </a:lnRef>
+      <a:fillRef idx="1">
+        <a:scrgbClr r="0" g="0" b="0"/>
+      </a:fillRef>
+      <a:effectRef idx="0">
+        <a:scrgbClr r="0" g="0" b="0"/>
+      </a:effectRef>
+      <a:fontRef idx="minor">
+        <a:schemeClr val="lt1"/>
+      </a:fontRef>
+    </dgm:style>
+  </dgm:styleLbl>
+  <dgm:styleLbl name="bgSibTrans2D1">
+    <dgm:scene3d>
+      <a:camera prst="orthographicFront"/>
+      <a:lightRig rig="threePt" dir="t"/>
+    </dgm:scene3d>
+    <dgm:sp3d/>
+    <dgm:txPr/>
+    <dgm:style>
+      <a:lnRef idx="0">
+        <a:scrgbClr r="0" g="0" b="0"/>
+      </a:lnRef>
+      <a:fillRef idx="1">
+        <a:scrgbClr r="0" g="0" b="0"/>
+      </a:fillRef>
+      <a:effectRef idx="0">
+        <a:scrgbClr r="0" g="0" b="0"/>
+      </a:effectRef>
+      <a:fontRef idx="minor">
+        <a:schemeClr val="lt1"/>
+      </a:fontRef>
+    </dgm:style>
+  </dgm:styleLbl>
+  <dgm:styleLbl name="sibTrans1D1">
+    <dgm:scene3d>
+      <a:camera prst="orthographicFront"/>
+      <a:lightRig rig="threePt" dir="t"/>
+    </dgm:scene3d>
+    <dgm:sp3d/>
+    <dgm:txPr/>
+    <dgm:style>
+      <a:lnRef idx="1">
+        <a:scrgbClr r="0" g="0" b="0"/>
+      </a:lnRef>
+      <a:fillRef idx="0">
+        <a:scrgbClr r="0" g="0" b="0"/>
+      </a:fillRef>
+      <a:effectRef idx="0">
+        <a:scrgbClr r="0" g="0" b="0"/>
+      </a:effectRef>
+      <a:fontRef idx="minor"/>
+    </dgm:style>
+  </dgm:styleLbl>
+  <dgm:styleLbl name="callout">
+    <dgm:scene3d>
+      <a:camera prst="orthographicFront"/>
+      <a:lightRig rig="threePt" dir="t"/>
+    </dgm:scene3d>
+    <dgm:sp3d/>
+    <dgm:txPr/>
+    <dgm:style>
+      <a:lnRef idx="2">
+        <a:scrgbClr r="0" g="0" b="0"/>
+      </a:lnRef>
+      <a:fillRef idx="1">
+        <a:scrgbClr r="0" g="0" b="0"/>
+      </a:fillRef>
+      <a:effectRef idx="0">
+        <a:scrgbClr r="0" g="0" b="0"/>
+      </a:effectRef>
+      <a:fontRef idx="minor"/>
+    </dgm:style>
+  </dgm:styleLbl>
+  <dgm:styleLbl name="asst0">
+    <dgm:scene3d>
+      <a:camera prst="orthographicFront"/>
+      <a:lightRig rig="threePt" dir="t"/>
+    </dgm:scene3d>
+    <dgm:sp3d/>
+    <dgm:txPr/>
+    <dgm:style>
+      <a:lnRef idx="2">
+        <a:scrgbClr r="0" g="0" b="0"/>
+      </a:lnRef>
+      <a:fillRef idx="1">
+        <a:scrgbClr r="0" g="0" b="0"/>
+      </a:fillRef>
+      <a:effectRef idx="0">
+        <a:scrgbClr r="0" g="0" b="0"/>
+      </a:effectRef>
+      <a:fontRef idx="minor">
+        <a:schemeClr val="lt1"/>
+      </a:fontRef>
+    </dgm:style>
+  </dgm:styleLbl>
+  <dgm:styleLbl name="asst1">
+    <dgm:scene3d>
+      <a:camera prst="orthographicFront"/>
+      <a:lightRig rig="threePt" dir="t"/>
+    </dgm:scene3d>
+    <dgm:sp3d/>
+    <dgm:txPr/>
+    <dgm:style>
+      <a:lnRef idx="2">
+        <a:scrgbClr r="0" g="0" b="0"/>
+      </a:lnRef>
+      <a:fillRef idx="1">
+        <a:scrgbClr r="0" g="0" b="0"/>
+      </a:fillRef>
+      <a:effectRef idx="0">
+        <a:scrgbClr r="0" g="0" b="0"/>
+      </a:effectRef>
+      <a:fontRef idx="minor">
+        <a:schemeClr val="lt1"/>
+      </a:fontRef>
+    </dgm:style>
+  </dgm:styleLbl>
+  <dgm:styleLbl name="asst2">
+    <dgm:scene3d>
+      <a:camera prst="orthographicFront"/>
+      <a:lightRig rig="threePt" dir="t"/>
+    </dgm:scene3d>
+    <dgm:sp3d/>
+    <dgm:txPr/>
+    <dgm:style>
+      <a:lnRef idx="2">
+        <a:scrgbClr r="0" g="0" b="0"/>
+      </a:lnRef>
+      <a:fillRef idx="1">
+        <a:scrgbClr r="0" g="0" b="0"/>
+      </a:fillRef>
+      <a:effectRef idx="0">
+        <a:scrgbClr r="0" g="0" b="0"/>
+      </a:effectRef>
+      <a:fontRef idx="minor">
+        <a:schemeClr val="lt1"/>
+      </a:fontRef>
+    </dgm:style>
+  </dgm:styleLbl>
+  <dgm:styleLbl name="asst3">
+    <dgm:scene3d>
+      <a:camera prst="orthographicFront"/>
+      <a:lightRig rig="threePt" dir="t"/>
+    </dgm:scene3d>
+    <dgm:sp3d/>
+    <dgm:txPr/>
+    <dgm:style>
+      <a:lnRef idx="2">
+        <a:scrgbClr r="0" g="0" b="0"/>
+      </a:lnRef>
+      <a:fillRef idx="1">
+        <a:scrgbClr r="0" g="0" b="0"/>
+      </a:fillRef>
+      <a:effectRef idx="0">
+        <a:scrgbClr r="0" g="0" b="0"/>
+      </a:effectRef>
+      <a:fontRef idx="minor">
+        <a:schemeClr val="lt1"/>
+      </a:fontRef>
+    </dgm:style>
+  </dgm:styleLbl>
+  <dgm:styleLbl name="asst4">
+    <dgm:scene3d>
+      <a:camera prst="orthographicFront"/>
+      <a:lightRig rig="threePt" dir="t"/>
+    </dgm:scene3d>
+    <dgm:sp3d/>
+    <dgm:txPr/>
+    <dgm:style>
+      <a:lnRef idx="2">
+        <a:scrgbClr r="0" g="0" b="0"/>
+      </a:lnRef>
+      <a:fillRef idx="1">
+        <a:scrgbClr r="0" g="0" b="0"/>
+      </a:fillRef>
+      <a:effectRef idx="0">
+        <a:scrgbClr r="0" g="0" b="0"/>
+      </a:effectRef>
+      <a:fontRef idx="minor">
+        <a:schemeClr val="lt1"/>
+      </a:fontRef>
+    </dgm:style>
+  </dgm:styleLbl>
+  <dgm:styleLbl name="parChTrans2D1">
+    <dgm:scene3d>
+      <a:camera prst="orthographicFront"/>
+      <a:lightRig rig="threePt" dir="t"/>
+    </dgm:scene3d>
+    <dgm:sp3d/>
+    <dgm:txPr/>
+    <dgm:style>
+      <a:lnRef idx="2">
+        <a:scrgbClr r="0" g="0" b="0"/>
+      </a:lnRef>
+      <a:fillRef idx="1">
+        <a:scrgbClr r="0" g="0" b="0"/>
+      </a:fillRef>
+      <a:effectRef idx="0">
+        <a:scrgbClr r="0" g="0" b="0"/>
+      </a:effectRef>
+      <a:fontRef idx="minor">
+        <a:schemeClr val="lt1"/>
+      </a:fontRef>
+    </dgm:style>
+  </dgm:styleLbl>
+  <dgm:styleLbl name="parChTrans2D2">
+    <dgm:scene3d>
+      <a:camera prst="orthographicFront"/>
+      <a:lightRig rig="threePt" dir="t"/>
+    </dgm:scene3d>
+    <dgm:sp3d/>
+    <dgm:txPr/>
+    <dgm:style>
+      <a:lnRef idx="2">
+        <a:scrgbClr r="0" g="0" b="0"/>
+      </a:lnRef>
+      <a:fillRef idx="1">
+        <a:scrgbClr r="0" g="0" b="0"/>
+      </a:fillRef>
+      <a:effectRef idx="0">
+        <a:scrgbClr r="0" g="0" b="0"/>
+      </a:effectRef>
+      <a:fontRef idx="minor">
+        <a:schemeClr val="lt1"/>
+      </a:fontRef>
+    </dgm:style>
+  </dgm:styleLbl>
+  <dgm:styleLbl name="parChTrans2D3">
+    <dgm:scene3d>
+      <a:camera prst="orthographicFront"/>
+      <a:lightRig rig="threePt" dir="t"/>
+    </dgm:scene3d>
+    <dgm:sp3d/>
+    <dgm:txPr/>
+    <dgm:style>
+      <a:lnRef idx="2">
+        <a:scrgbClr r="0" g="0" b="0"/>
+      </a:lnRef>
+      <a:fillRef idx="1">
+        <a:scrgbClr r="0" g="0" b="0"/>
+      </a:fillRef>
+      <a:effectRef idx="0">
+        <a:scrgbClr r="0" g="0" b="0"/>
+      </a:effectRef>
+      <a:fontRef idx="minor">
+        <a:schemeClr val="lt1"/>
+      </a:fontRef>
+    </dgm:style>
+  </dgm:styleLbl>
+  <dgm:styleLbl name="parChTrans2D4">
+    <dgm:scene3d>
+      <a:camera prst="orthographicFront"/>
+      <a:lightRig rig="threePt" dir="t"/>
+    </dgm:scene3d>
+    <dgm:sp3d/>
+    <dgm:txPr/>
+    <dgm:style>
+      <a:lnRef idx="2">
+        <a:scrgbClr r="0" g="0" b="0"/>
+      </a:lnRef>
+      <a:fillRef idx="1">
+        <a:scrgbClr r="0" g="0" b="0"/>
+      </a:fillRef>
+      <a:effectRef idx="0">
+        <a:scrgbClr r="0" g="0" b="0"/>
+      </a:effectRef>
+      <a:fontRef idx="minor">
+        <a:schemeClr val="lt1"/>
+      </a:fontRef>
+    </dgm:style>
+  </dgm:styleLbl>
+  <dgm:styleLbl name="parChTrans1D1">
+    <dgm:scene3d>
+      <a:camera prst="orthographicFront"/>
+      <a:lightRig rig="threePt" dir="t"/>
+    </dgm:scene3d>
+    <dgm:sp3d/>
+    <dgm:txPr/>
+    <dgm:style>
+      <a:lnRef idx="2">
+        <a:scrgbClr r="0" g="0" b="0"/>
+      </a:lnRef>
+      <a:fillRef idx="0">
+        <a:scrgbClr r="0" g="0" b="0"/>
+      </a:fillRef>
+      <a:effectRef idx="0">
+        <a:scrgbClr r="0" g="0" b="0"/>
+      </a:effectRef>
+      <a:fontRef idx="minor"/>
+    </dgm:style>
+  </dgm:styleLbl>
+  <dgm:styleLbl name="parChTrans1D2">
+    <dgm:scene3d>
+      <a:camera prst="orthographicFront"/>
+      <a:lightRig rig="threePt" dir="t"/>
+    </dgm:scene3d>
+    <dgm:sp3d/>
+    <dgm:txPr/>
+    <dgm:style>
+      <a:lnRef idx="2">
+        <a:scrgbClr r="0" g="0" b="0"/>
+      </a:lnRef>
+      <a:fillRef idx="0">
+        <a:scrgbClr r="0" g="0" b="0"/>
+      </a:fillRef>
+      <a:effectRef idx="0">
+        <a:scrgbClr r="0" g="0" b="0"/>
+      </a:effectRef>
+      <a:fontRef idx="minor"/>
+    </dgm:style>
+  </dgm:styleLbl>
+  <dgm:styleLbl name="parChTrans1D3">
+    <dgm:scene3d>
+      <a:camera prst="orthographicFront"/>
+      <a:lightRig rig="threePt" dir="t"/>
+    </dgm:scene3d>
+    <dgm:sp3d/>
+    <dgm:txPr/>
+    <dgm:style>
+      <a:lnRef idx="2">
+        <a:scrgbClr r="0" g="0" b="0"/>
+      </a:lnRef>
+      <a:fillRef idx="0">
+        <a:scrgbClr r="0" g="0" b="0"/>
+      </a:fillRef>
+      <a:effectRef idx="0">
+        <a:scrgbClr r="0" g="0" b="0"/>
+      </a:effectRef>
+      <a:fontRef idx="minor"/>
+    </dgm:style>
+  </dgm:styleLbl>
+  <dgm:styleLbl name="parChTrans1D4">
+    <dgm:scene3d>
+      <a:camera prst="orthographicFront"/>
+      <a:lightRig rig="threePt" dir="t"/>
+    </dgm:scene3d>
+    <dgm:sp3d/>
+    <dgm:txPr/>
+    <dgm:style>
+      <a:lnRef idx="2">
+        <a:scrgbClr r="0" g="0" b="0"/>
+      </a:lnRef>
+      <a:fillRef idx="0">
+        <a:scrgbClr r="0" g="0" b="0"/>
+      </a:fillRef>
+      <a:effectRef idx="0">
+        <a:scrgbClr r="0" g="0" b="0"/>
+      </a:effectRef>
+      <a:fontRef idx="minor"/>
+    </dgm:style>
+  </dgm:styleLbl>
+  <dgm:styleLbl name="fgAcc1">
+    <dgm:scene3d>
+      <a:camera prst="orthographicFront"/>
+      <a:lightRig rig="threePt" dir="t"/>
+    </dgm:scene3d>
+    <dgm:sp3d/>
+    <dgm:txPr/>
+    <dgm:style>
+      <a:lnRef idx="2">
+        <a:scrgbClr r="0" g="0" b="0"/>
+      </a:lnRef>
+      <a:fillRef idx="1">
+        <a:scrgbClr r="0" g="0" b="0"/>
+      </a:fillRef>
+      <a:effectRef idx="0">
+        <a:scrgbClr r="0" g="0" b="0"/>
+      </a:effectRef>
+      <a:fontRef idx="minor"/>
+    </dgm:style>
+  </dgm:styleLbl>
+  <dgm:styleLbl name="conFgAcc1">
+    <dgm:scene3d>
+      <a:camera prst="orthographicFront"/>
+      <a:lightRig rig="threePt" dir="t"/>
+    </dgm:scene3d>
+    <dgm:sp3d/>
+    <dgm:txPr/>
+    <dgm:style>
+      <a:lnRef idx="2">
+        <a:scrgbClr r="0" g="0" b="0"/>
+      </a:lnRef>
+      <a:fillRef idx="1">
+        <a:scrgbClr r="0" g="0" b="0"/>
+      </a:fillRef>
+      <a:effectRef idx="0">
+        <a:scrgbClr r="0" g="0" b="0"/>
+      </a:effectRef>
+      <a:fontRef idx="minor"/>
+    </dgm:style>
+  </dgm:styleLbl>
+  <dgm:styleLbl name="alignAcc1">
+    <dgm:scene3d>
+      <a:camera prst="orthographicFront"/>
+      <a:lightRig rig="threePt" dir="t"/>
+    </dgm:scene3d>
+    <dgm:sp3d/>
+    <dgm:txPr/>
+    <dgm:style>
+      <a:lnRef idx="2">
+        <a:scrgbClr r="0" g="0" b="0"/>
+      </a:lnRef>
+      <a:fillRef idx="1">
+        <a:scrgbClr r="0" g="0" b="0"/>
+      </a:fillRef>
+      <a:effectRef idx="0">
+        <a:scrgbClr r="0" g="0" b="0"/>
+      </a:effectRef>
+      <a:fontRef idx="minor"/>
+    </dgm:style>
+  </dgm:styleLbl>
+  <dgm:styleLbl name="trAlignAcc1">
+    <dgm:scene3d>
+      <a:camera prst="orthographicFront"/>
+      <a:lightRig rig="threePt" dir="t"/>
+    </dgm:scene3d>
+    <dgm:sp3d/>
+    <dgm:txPr/>
+    <dgm:style>
+      <a:lnRef idx="1">
+        <a:scrgbClr r="0" g="0" b="0"/>
+      </a:lnRef>
+      <a:fillRef idx="1">
+        <a:scrgbClr r="0" g="0" b="0"/>
+      </a:fillRef>
+      <a:effectRef idx="0">
+        <a:scrgbClr r="0" g="0" b="0"/>
+      </a:effectRef>
+      <a:fontRef idx="minor"/>
+    </dgm:style>
+  </dgm:styleLbl>
+  <dgm:styleLbl name="bgAcc1">
+    <dgm:scene3d>
+      <a:camera prst="orthographicFront"/>
+      <a:lightRig rig="threePt" dir="t"/>
+    </dgm:scene3d>
+    <dgm:sp3d/>
+    <dgm:txPr/>
+    <dgm:style>
+      <a:lnRef idx="2">
+        <a:scrgbClr r="0" g="0" b="0"/>
+      </a:lnRef>
+      <a:fillRef idx="1">
+        <a:scrgbClr r="0" g="0" b="0"/>
+      </a:fillRef>
+      <a:effectRef idx="0">
+        <a:scrgbClr r="0" g="0" b="0"/>
+      </a:effectRef>
+      <a:fontRef idx="minor"/>
+    </dgm:style>
+  </dgm:styleLbl>
+  <dgm:styleLbl name="solidFgAcc1">
+    <dgm:scene3d>
+      <a:camera prst="orthographicFront"/>
+      <a:lightRig rig="threePt" dir="t"/>
+    </dgm:scene3d>
+    <dgm:sp3d/>
+    <dgm:txPr/>
+    <dgm:style>
+      <a:lnRef idx="2">
+        <a:scrgbClr r="0" g="0" b="0"/>
+      </a:lnRef>
+      <a:fillRef idx="1">
+        <a:scrgbClr r="0" g="0" b="0"/>
+      </a:fillRef>
+      <a:effectRef idx="0">
+        <a:scrgbClr r="0" g="0" b="0"/>
+      </a:effectRef>
+      <a:fontRef idx="minor"/>
+    </dgm:style>
+  </dgm:styleLbl>
+  <dgm:styleLbl name="solidAlignAcc1">
+    <dgm:scene3d>
+      <a:camera prst="orthographicFront"/>
+      <a:lightRig rig="threePt" dir="t"/>
+    </dgm:scene3d>
+    <dgm:sp3d/>
+    <dgm:txPr/>
+    <dgm:style>
+      <a:lnRef idx="2">
+        <a:scrgbClr r="0" g="0" b="0"/>
+      </a:lnRef>
+      <a:fillRef idx="1">
+        <a:scrgbClr r="0" g="0" b="0"/>
+      </a:fillRef>
+      <a:effectRef idx="0">
+        <a:scrgbClr r="0" g="0" b="0"/>
+      </a:effectRef>
+      <a:fontRef idx="minor"/>
+    </dgm:style>
+  </dgm:styleLbl>
+  <dgm:styleLbl name="solidBgAcc1">
+    <dgm:scene3d>
+      <a:camera prst="orthographicFront"/>
+      <a:lightRig rig="threePt" dir="t"/>
+    </dgm:scene3d>
+    <dgm:sp3d/>
+    <dgm:txPr/>
+    <dgm:style>
+      <a:lnRef idx="2">
+        <a:scrgbClr r="0" g="0" b="0"/>
+      </a:lnRef>
+      <a:fillRef idx="1">
+        <a:scrgbClr r="0" g="0" b="0"/>
+      </a:fillRef>
+      <a:effectRef idx="0">
+        <a:scrgbClr r="0" g="0" b="0"/>
+      </a:effectRef>
+      <a:fontRef idx="minor"/>
+    </dgm:style>
+  </dgm:styleLbl>
+  <dgm:styleLbl name="fgAccFollowNode1">
+    <dgm:scene3d>
+      <a:camera prst="orthographicFront"/>
+      <a:lightRig rig="threePt" dir="t"/>
+    </dgm:scene3d>
+    <dgm:sp3d/>
+    <dgm:txPr/>
+    <dgm:style>
+      <a:lnRef idx="2">
+        <a:scrgbClr r="0" g="0" b="0"/>
+      </a:lnRef>
+      <a:fillRef idx="1">
+        <a:scrgbClr r="0" g="0" b="0"/>
+      </a:fillRef>
+      <a:effectRef idx="0">
+        <a:scrgbClr r="0" g="0" b="0"/>
+      </a:effectRef>
+      <a:fontRef idx="minor"/>
+    </dgm:style>
+  </dgm:styleLbl>
+  <dgm:styleLbl name="alignAccFollowNode1">
+    <dgm:scene3d>
+      <a:camera prst="orthographicFront"/>
+      <a:lightRig rig="threePt" dir="t"/>
+    </dgm:scene3d>
+    <dgm:sp3d/>
+    <dgm:txPr/>
+    <dgm:style>
+      <a:lnRef idx="2">
+        <a:scrgbClr r="0" g="0" b="0"/>
+      </a:lnRef>
+      <a:fillRef idx="1">
+        <a:scrgbClr r="0" g="0" b="0"/>
+      </a:fillRef>
+      <a:effectRef idx="0">
+        <a:scrgbClr r="0" g="0" b="0"/>
+      </a:effectRef>
+      <a:fontRef idx="minor"/>
+    </dgm:style>
+  </dgm:styleLbl>
+  <dgm:styleLbl name="bgAccFollowNode1">
+    <dgm:scene3d>
+      <a:camera prst="orthographicFront"/>
+      <a:lightRig rig="threePt" dir="t"/>
+    </dgm:scene3d>
+    <dgm:sp3d/>
+    <dgm:txPr/>
+    <dgm:style>
+      <a:lnRef idx="2">
+        <a:scrgbClr r="0" g="0" b="0"/>
+      </a:lnRef>
+      <a:fillRef idx="1">
+        <a:scrgbClr r="0" g="0" b="0"/>
+      </a:fillRef>
+      <a:effectRef idx="0">
+        <a:scrgbClr r="0" g="0" b="0"/>
+      </a:effectRef>
+      <a:fontRef idx="minor"/>
+    </dgm:style>
+  </dgm:styleLbl>
+  <dgm:styleLbl name="fgAcc0">
+    <dgm:scene3d>
+      <a:camera prst="orthographicFront"/>
+      <a:lightRig rig="threePt" dir="t"/>
+    </dgm:scene3d>
+    <dgm:sp3d/>
+    <dgm:txPr/>
+    <dgm:style>
+      <a:lnRef idx="2">
+        <a:scrgbClr r="0" g="0" b="0"/>
+      </a:lnRef>
+      <a:fillRef idx="1">
+        <a:scrgbClr r="0" g="0" b="0"/>
+      </a:fillRef>
+      <a:effectRef idx="0">
+        <a:scrgbClr r="0" g="0" b="0"/>
+      </a:effectRef>
+      <a:fontRef idx="minor"/>
+    </dgm:style>
+  </dgm:styleLbl>
+  <dgm:styleLbl name="fgAcc2">
+    <dgm:scene3d>
+      <a:camera prst="orthographicFront"/>
+      <a:lightRig rig="threePt" dir="t"/>
+    </dgm:scene3d>
+    <dgm:sp3d/>
+    <dgm:txPr/>
+    <dgm:style>
+      <a:lnRef idx="2">
+        <a:scrgbClr r="0" g="0" b="0"/>
+      </a:lnRef>
+      <a:fillRef idx="1">
+        <a:scrgbClr r="0" g="0" b="0"/>
+      </a:fillRef>
+      <a:effectRef idx="0">
+        <a:scrgbClr r="0" g="0" b="0"/>
+      </a:effectRef>
+      <a:fontRef idx="minor"/>
+    </dgm:style>
+  </dgm:styleLbl>
+  <dgm:styleLbl name="fgAcc3">
+    <dgm:scene3d>
+      <a:camera prst="orthographicFront"/>
+      <a:lightRig rig="threePt" dir="t"/>
+    </dgm:scene3d>
+    <dgm:sp3d/>
+    <dgm:txPr/>
+    <dgm:style>
+      <a:lnRef idx="2">
+        <a:scrgbClr r="0" g="0" b="0"/>
+      </a:lnRef>
+      <a:fillRef idx="1">
+        <a:scrgbClr r="0" g="0" b="0"/>
+      </a:fillRef>
+      <a:effectRef idx="0">
+        <a:scrgbClr r="0" g="0" b="0"/>
+      </a:effectRef>
+      <a:fontRef idx="minor"/>
+    </dgm:style>
+  </dgm:styleLbl>
+  <dgm:styleLbl name="fgAcc4">
+    <dgm:scene3d>
+      <a:camera prst="orthographicFront"/>
+      <a:lightRig rig="threePt" dir="t"/>
+    </dgm:scene3d>
+    <dgm:sp3d/>
+    <dgm:txPr/>
+    <dgm:style>
+      <a:lnRef idx="2">
+        <a:scrgbClr r="0" g="0" b="0"/>
+      </a:lnRef>
+      <a:fillRef idx="1">
+        <a:scrgbClr r="0" g="0" b="0"/>
+      </a:fillRef>
+      <a:effectRef idx="0">
+        <a:scrgbClr r="0" g="0" b="0"/>
+      </a:effectRef>
+      <a:fontRef idx="minor"/>
+    </dgm:style>
+  </dgm:styleLbl>
+  <dgm:styleLbl name="bgShp">
+    <dgm:scene3d>
+      <a:camera prst="orthographicFront"/>
+      <a:lightRig rig="threePt" dir="t"/>
+    </dgm:scene3d>
+    <dgm:sp3d/>
+    <dgm:txPr/>
+    <dgm:style>
+      <a:lnRef idx="0">
+        <a:scrgbClr r="0" g="0" b="0"/>
+      </a:lnRef>
+      <a:fillRef idx="1">
+        <a:scrgbClr r="0" g="0" b="0"/>
+      </a:fillRef>
+      <a:effectRef idx="0">
+        <a:scrgbClr r="0" g="0" b="0"/>
+      </a:effectRef>
+      <a:fontRef idx="minor"/>
+    </dgm:style>
+  </dgm:styleLbl>
+  <dgm:styleLbl name="dkBgShp">
+    <dgm:scene3d>
+      <a:camera prst="orthographicFront"/>
+      <a:lightRig rig="threePt" dir="t"/>
+    </dgm:scene3d>
+    <dgm:sp3d/>
+    <dgm:txPr/>
+    <dgm:style>
+      <a:lnRef idx="0">
+        <a:scrgbClr r="0" g="0" b="0"/>
+      </a:lnRef>
+      <a:fillRef idx="1">
+        <a:scrgbClr r="0" g="0" b="0"/>
+      </a:fillRef>
+      <a:effectRef idx="0">
+        <a:scrgbClr r="0" g="0" b="0"/>
+      </a:effectRef>
+      <a:fontRef idx="minor"/>
+    </dgm:style>
+  </dgm:styleLbl>
+  <dgm:styleLbl name="trBgShp">
+    <dgm:scene3d>
+      <a:camera prst="orthographicFront"/>
+      <a:lightRig rig="threePt" dir="t"/>
+    </dgm:scene3d>
+    <dgm:sp3d/>
+    <dgm:txPr/>
+    <dgm:style>
+      <a:lnRef idx="0">
+        <a:scrgbClr r="0" g="0" b="0"/>
+      </a:lnRef>
+      <a:fillRef idx="1">
+        <a:scrgbClr r="0" g="0" b="0"/>
+      </a:fillRef>
+      <a:effectRef idx="0">
+        <a:scrgbClr r="0" g="0" b="0"/>
+      </a:effectRef>
+      <a:fontRef idx="minor"/>
+    </dgm:style>
+  </dgm:styleLbl>
+  <dgm:styleLbl name="fgShp">
+    <dgm:scene3d>
+      <a:camera prst="orthographicFront"/>
+      <a:lightRig rig="threePt" dir="t"/>
+    </dgm:scene3d>
+    <dgm:sp3d/>
+    <dgm:txPr/>
+    <dgm:style>
+      <a:lnRef idx="2">
+        <a:scrgbClr r="0" g="0" b="0"/>
+      </a:lnRef>
+      <a:fillRef idx="1">
+        <a:scrgbClr r="0" g="0" b="0"/>
+      </a:fillRef>
+      <a:effectRef idx="0">
+        <a:scrgbClr r="0" g="0" b="0"/>
+      </a:effectRef>
+      <a:fontRef idx="minor"/>
+    </dgm:style>
+  </dgm:styleLbl>
+  <dgm:styleLbl name="revTx">
+    <dgm:scene3d>
+      <a:camera prst="orthographicFront"/>
+      <a:lightRig rig="threePt" dir="t"/>
+    </dgm:scene3d>
+    <dgm:sp3d/>
+    <dgm:txPr/>
+    <dgm:style>
+      <a:lnRef idx="0">
+        <a:scrgbClr r="0" g="0" b="0"/>
+      </a:lnRef>
+      <a:fillRef idx="0">
+        <a:scrgbClr r="0" g="0" b="0"/>
+      </a:fillRef>
+      <a:effectRef idx="0">
+        <a:scrgbClr r="0" g="0" b="0"/>
+      </a:effectRef>
+      <a:fontRef idx="minor"/>
+    </dgm:style>
+  </dgm:styleLbl>
+</dgm:styleDef>
+</file>
+
+<file path=ppt/diagrams/quickStyle2.xml><?xml version="1.0" encoding="utf-8"?>
 <dgm:styleDef xmlns:dgm="http://schemas.openxmlformats.org/drawingml/2006/diagram" xmlns:a="http://schemas.openxmlformats.org/drawingml/2006/main" uniqueId="urn:microsoft.com/office/officeart/2005/8/quickstyle/simple1">
   <dgm:title val=""/>
   <dgm:desc val=""/>
@@ -8089,10 +10834,10 @@
       </p:sp>
       <p:pic>
         <p:nvPicPr>
-          <p:cNvPr id="4" name="Picture 3">
+          <p:cNvPr id="3" name="Picture 2">
             <a:extLst>
               <a:ext uri="{FF2B5EF4-FFF2-40B4-BE49-F238E27FC236}">
-                <a16:creationId xmlns:a16="http://schemas.microsoft.com/office/drawing/2014/main" id="{C2F2FED8-3990-4B68-898D-9E756021378C}"/>
+                <a16:creationId xmlns:a16="http://schemas.microsoft.com/office/drawing/2014/main" id="{3BDE9D3A-AF91-443B-94DB-896177A18D81}"/>
               </a:ext>
             </a:extLst>
           </p:cNvPr>
@@ -8109,8 +10854,8 @@
         </p:blipFill>
         <p:spPr>
           <a:xfrm>
-            <a:off x="1834141" y="1940559"/>
-            <a:ext cx="8584677" cy="3717422"/>
+            <a:off x="1767505" y="1958105"/>
+            <a:ext cx="8656990" cy="3793766"/>
           </a:xfrm>
           <a:prstGeom prst="rect">
             <a:avLst/>
@@ -9640,6 +12385,315 @@
 <file path=ppt/slides/slide16.xml><?xml version="1.0" encoding="utf-8"?>
 <p:sld xmlns:a="http://schemas.openxmlformats.org/drawingml/2006/main" xmlns:r="http://schemas.openxmlformats.org/officeDocument/2006/relationships" xmlns:p="http://schemas.openxmlformats.org/presentationml/2006/main">
   <p:cSld>
+    <p:bg>
+      <p:bgPr>
+        <a:solidFill>
+          <a:schemeClr val="bg1"/>
+        </a:solidFill>
+        <a:effectLst/>
+      </p:bgPr>
+    </p:bg>
+    <p:spTree>
+      <p:nvGrpSpPr>
+        <p:cNvPr id="1" name=""/>
+        <p:cNvGrpSpPr/>
+        <p:nvPr/>
+      </p:nvGrpSpPr>
+      <p:grpSpPr>
+        <a:xfrm>
+          <a:off x="0" y="0"/>
+          <a:ext cx="0" cy="0"/>
+          <a:chOff x="0" y="0"/>
+          <a:chExt cx="0" cy="0"/>
+        </a:xfrm>
+      </p:grpSpPr>
+      <p:sp useBgFill="1">
+        <p:nvSpPr>
+          <p:cNvPr id="16" name="Rectangle 9">
+            <a:extLst>
+              <a:ext uri="{FF2B5EF4-FFF2-40B4-BE49-F238E27FC236}">
+                <a16:creationId xmlns:a16="http://schemas.microsoft.com/office/drawing/2014/main" id="{FB5993E2-C02B-4335-ABA5-D8EC465551E3}"/>
+              </a:ext>
+              <a:ext uri="{C183D7F6-B498-43B3-948B-1728B52AA6E4}">
+                <adec:decorative xmlns:adec="http://schemas.microsoft.com/office/drawing/2017/decorative" val="1"/>
+              </a:ext>
+            </a:extLst>
+          </p:cNvPr>
+          <p:cNvSpPr>
+            <a:spLocks noGrp="1" noRot="1" noChangeAspect="1" noMove="1" noResize="1" noEditPoints="1" noAdjustHandles="1" noChangeArrowheads="1" noChangeShapeType="1" noTextEdit="1"/>
+          </p:cNvSpPr>
+          <p:nvPr>
+            <p:extLst>
+              <p:ext uri="{386F3935-93C4-4BCD-93E2-E3B085C9AB24}">
+                <p16:designElem xmlns:p16="http://schemas.microsoft.com/office/powerpoint/2015/main" val="1"/>
+              </p:ext>
+            </p:extLst>
+          </p:nvPr>
+        </p:nvSpPr>
+        <p:spPr>
+          <a:xfrm>
+            <a:off x="0" y="0"/>
+            <a:ext cx="12186315" cy="6858000"/>
+          </a:xfrm>
+          <a:prstGeom prst="rect">
+            <a:avLst/>
+          </a:prstGeom>
+          <a:ln>
+            <a:noFill/>
+          </a:ln>
+        </p:spPr>
+        <p:style>
+          <a:lnRef idx="2">
+            <a:schemeClr val="accent6">
+              <a:shade val="50000"/>
+            </a:schemeClr>
+          </a:lnRef>
+          <a:fillRef idx="1001">
+            <a:schemeClr val="lt1"/>
+          </a:fillRef>
+          <a:effectRef idx="0">
+            <a:schemeClr val="accent6"/>
+          </a:effectRef>
+          <a:fontRef idx="minor">
+            <a:schemeClr val="lt1"/>
+          </a:fontRef>
+        </p:style>
+        <p:txBody>
+          <a:bodyPr rtlCol="0" anchor="ctr"/>
+          <a:lstStyle/>
+          <a:p>
+            <a:pPr algn="ctr"/>
+            <a:endParaRPr lang="en-US"/>
+          </a:p>
+        </p:txBody>
+      </p:sp>
+      <p:sp>
+        <p:nvSpPr>
+          <p:cNvPr id="17" name="Rectangle 11">
+            <a:extLst>
+              <a:ext uri="{FF2B5EF4-FFF2-40B4-BE49-F238E27FC236}">
+                <a16:creationId xmlns:a16="http://schemas.microsoft.com/office/drawing/2014/main" id="{C0B801A2-5622-4BE8-9AD2-C337A2CD0022}"/>
+              </a:ext>
+              <a:ext uri="{C183D7F6-B498-43B3-948B-1728B52AA6E4}">
+                <adec:decorative xmlns:adec="http://schemas.microsoft.com/office/drawing/2017/decorative" val="1"/>
+              </a:ext>
+            </a:extLst>
+          </p:cNvPr>
+          <p:cNvSpPr>
+            <a:spLocks noGrp="1" noRot="1" noChangeAspect="1" noMove="1" noResize="1" noEditPoints="1" noAdjustHandles="1" noChangeArrowheads="1" noChangeShapeType="1" noTextEdit="1"/>
+          </p:cNvSpPr>
+          <p:nvPr>
+            <p:extLst>
+              <p:ext uri="{386F3935-93C4-4BCD-93E2-E3B085C9AB24}">
+                <p16:designElem xmlns:p16="http://schemas.microsoft.com/office/powerpoint/2015/main" val="1"/>
+              </p:ext>
+            </p:extLst>
+          </p:nvPr>
+        </p:nvSpPr>
+        <p:spPr>
+          <a:xfrm>
+            <a:off x="16" y="0"/>
+            <a:ext cx="4050791" cy="6858000"/>
+          </a:xfrm>
+          <a:prstGeom prst="rect">
+            <a:avLst/>
+          </a:prstGeom>
+          <a:solidFill>
+            <a:schemeClr val="accent2"/>
+          </a:solidFill>
+          <a:ln>
+            <a:noFill/>
+          </a:ln>
+        </p:spPr>
+        <p:style>
+          <a:lnRef idx="2">
+            <a:schemeClr val="accent1">
+              <a:shade val="50000"/>
+            </a:schemeClr>
+          </a:lnRef>
+          <a:fillRef idx="1">
+            <a:schemeClr val="accent1"/>
+          </a:fillRef>
+          <a:effectRef idx="0">
+            <a:schemeClr val="accent1"/>
+          </a:effectRef>
+          <a:fontRef idx="minor">
+            <a:schemeClr val="lt1"/>
+          </a:fontRef>
+        </p:style>
+      </p:sp>
+      <p:sp>
+        <p:nvSpPr>
+          <p:cNvPr id="2" name="Title 1">
+            <a:extLst>
+              <a:ext uri="{FF2B5EF4-FFF2-40B4-BE49-F238E27FC236}">
+                <a16:creationId xmlns:a16="http://schemas.microsoft.com/office/drawing/2014/main" id="{BB2E1A13-B8B3-4BAF-8E81-C9046D13C1A7}"/>
+              </a:ext>
+            </a:extLst>
+          </p:cNvPr>
+          <p:cNvSpPr>
+            <a:spLocks noGrp="1"/>
+          </p:cNvSpPr>
+          <p:nvPr>
+            <p:ph type="title"/>
+          </p:nvPr>
+        </p:nvSpPr>
+        <p:spPr>
+          <a:xfrm>
+            <a:off x="492370" y="516835"/>
+            <a:ext cx="3084844" cy="5772840"/>
+          </a:xfrm>
+        </p:spPr>
+        <p:txBody>
+          <a:bodyPr anchor="ctr">
+            <a:normAutofit/>
+          </a:bodyPr>
+          <a:lstStyle/>
+          <a:p>
+            <a:r>
+              <a:rPr lang="en-US" sz="3600">
+                <a:solidFill>
+                  <a:srgbClr val="FFFFFF"/>
+                </a:solidFill>
+              </a:rPr>
+              <a:t>Tổng kết</a:t>
+            </a:r>
+          </a:p>
+        </p:txBody>
+      </p:sp>
+      <p:sp>
+        <p:nvSpPr>
+          <p:cNvPr id="18" name="Rectangle 13">
+            <a:extLst>
+              <a:ext uri="{FF2B5EF4-FFF2-40B4-BE49-F238E27FC236}">
+                <a16:creationId xmlns:a16="http://schemas.microsoft.com/office/drawing/2014/main" id="{B7AF614F-5BC3-4086-99F5-B87C5847A071}"/>
+              </a:ext>
+              <a:ext uri="{C183D7F6-B498-43B3-948B-1728B52AA6E4}">
+                <adec:decorative xmlns:adec="http://schemas.microsoft.com/office/drawing/2017/decorative" val="1"/>
+              </a:ext>
+            </a:extLst>
+          </p:cNvPr>
+          <p:cNvSpPr>
+            <a:spLocks noGrp="1" noRot="1" noChangeAspect="1" noMove="1" noResize="1" noEditPoints="1" noAdjustHandles="1" noChangeArrowheads="1" noChangeShapeType="1" noTextEdit="1"/>
+          </p:cNvSpPr>
+          <p:nvPr>
+            <p:extLst>
+              <p:ext uri="{386F3935-93C4-4BCD-93E2-E3B085C9AB24}">
+                <p16:designElem xmlns:p16="http://schemas.microsoft.com/office/powerpoint/2015/main" val="1"/>
+              </p:ext>
+            </p:extLst>
+          </p:nvPr>
+        </p:nvSpPr>
+        <p:spPr>
+          <a:xfrm>
+            <a:off x="4040071" y="0"/>
+            <a:ext cx="64008" cy="6858000"/>
+          </a:xfrm>
+          <a:prstGeom prst="rect">
+            <a:avLst/>
+          </a:prstGeom>
+          <a:solidFill>
+            <a:schemeClr val="accent1"/>
+          </a:solidFill>
+          <a:ln>
+            <a:noFill/>
+          </a:ln>
+        </p:spPr>
+        <p:style>
+          <a:lnRef idx="2">
+            <a:schemeClr val="accent1">
+              <a:shade val="50000"/>
+            </a:schemeClr>
+          </a:lnRef>
+          <a:fillRef idx="1">
+            <a:schemeClr val="accent1"/>
+          </a:fillRef>
+          <a:effectRef idx="0">
+            <a:schemeClr val="accent1"/>
+          </a:effectRef>
+          <a:fontRef idx="minor">
+            <a:schemeClr val="lt1"/>
+          </a:fontRef>
+        </p:style>
+      </p:sp>
+      <p:graphicFrame>
+        <p:nvGraphicFramePr>
+          <p:cNvPr id="19" name="Content Placeholder 2">
+            <a:extLst>
+              <a:ext uri="{FF2B5EF4-FFF2-40B4-BE49-F238E27FC236}">
+                <a16:creationId xmlns:a16="http://schemas.microsoft.com/office/drawing/2014/main" id="{1C0EE2AE-946B-494E-A0E0-84920435C614}"/>
+              </a:ext>
+            </a:extLst>
+          </p:cNvPr>
+          <p:cNvGraphicFramePr>
+            <a:graphicFrameLocks noGrp="1"/>
+          </p:cNvGraphicFramePr>
+          <p:nvPr>
+            <p:ph idx="1"/>
+            <p:extLst>
+              <p:ext uri="{D42A27DB-BD31-4B8C-83A1-F6EECF244321}">
+                <p14:modId xmlns:p14="http://schemas.microsoft.com/office/powerpoint/2010/main" val="3541584532"/>
+              </p:ext>
+            </p:extLst>
+          </p:nvPr>
+        </p:nvGraphicFramePr>
+        <p:xfrm>
+          <a:off x="4741863" y="639763"/>
+          <a:ext cx="6797675" cy="5649912"/>
+        </p:xfrm>
+        <a:graphic>
+          <a:graphicData uri="http://schemas.openxmlformats.org/drawingml/2006/diagram">
+            <dgm:relIds xmlns:dgm="http://schemas.openxmlformats.org/drawingml/2006/diagram" xmlns:r="http://schemas.openxmlformats.org/officeDocument/2006/relationships" r:dm="rId2" r:lo="rId3" r:qs="rId4" r:cs="rId5"/>
+          </a:graphicData>
+        </a:graphic>
+      </p:graphicFrame>
+    </p:spTree>
+    <p:extLst>
+      <p:ext uri="{BB962C8B-B14F-4D97-AF65-F5344CB8AC3E}">
+        <p14:creationId xmlns:p14="http://schemas.microsoft.com/office/powerpoint/2010/main" val="3195975186"/>
+      </p:ext>
+    </p:extLst>
+  </p:cSld>
+  <p:clrMapOvr>
+    <a:masterClrMapping/>
+  </p:clrMapOvr>
+</p:sld>
+</file>
+
+<file path=ppt/slides/slide17.xml><?xml version="1.0" encoding="utf-8"?>
+<p:sld xmlns:a="http://schemas.openxmlformats.org/drawingml/2006/main" xmlns:r="http://schemas.openxmlformats.org/officeDocument/2006/relationships" xmlns:p="http://schemas.openxmlformats.org/presentationml/2006/main">
+  <p:cSld>
+    <p:bg>
+      <p:bgPr>
+        <a:gradFill rotWithShape="1">
+          <a:gsLst>
+            <a:gs pos="0">
+              <a:schemeClr val="bg2">
+                <a:tint val="96000"/>
+                <a:shade val="99000"/>
+                <a:satMod val="140000"/>
+              </a:schemeClr>
+            </a:gs>
+            <a:gs pos="65000">
+              <a:schemeClr val="bg2">
+                <a:tint val="100000"/>
+                <a:shade val="80000"/>
+                <a:satMod val="130000"/>
+              </a:schemeClr>
+            </a:gs>
+            <a:gs pos="100000">
+              <a:schemeClr val="bg2">
+                <a:tint val="100000"/>
+                <a:shade val="48000"/>
+                <a:satMod val="120000"/>
+              </a:schemeClr>
+            </a:gs>
+          </a:gsLst>
+          <a:lin ang="16200000" scaled="0"/>
+        </a:gradFill>
+        <a:effectLst/>
+      </p:bgPr>
+    </p:bg>
     <p:spTree>
       <p:nvGrpSpPr>
         <p:cNvPr id="1" name=""/>
@@ -9656,10 +12710,345 @@
       </p:grpSpPr>
       <p:sp>
         <p:nvSpPr>
+          <p:cNvPr id="8" name="Rectangle 7">
+            <a:extLst>
+              <a:ext uri="{FF2B5EF4-FFF2-40B4-BE49-F238E27FC236}">
+                <a16:creationId xmlns:a16="http://schemas.microsoft.com/office/drawing/2014/main" id="{52C0B2E1-0268-42EC-ABD3-94F81A05BCBD}"/>
+              </a:ext>
+              <a:ext uri="{C183D7F6-B498-43B3-948B-1728B52AA6E4}">
+                <adec:decorative xmlns:adec="http://schemas.microsoft.com/office/drawing/2017/decorative" val="1"/>
+              </a:ext>
+            </a:extLst>
+          </p:cNvPr>
+          <p:cNvSpPr>
+            <a:spLocks noGrp="1" noRot="1" noChangeAspect="1" noMove="1" noResize="1" noEditPoints="1" noAdjustHandles="1" noChangeArrowheads="1" noChangeShapeType="1" noTextEdit="1"/>
+          </p:cNvSpPr>
+          <p:nvPr>
+            <p:extLst>
+              <p:ext uri="{386F3935-93C4-4BCD-93E2-E3B085C9AB24}">
+                <p16:designElem xmlns:p16="http://schemas.microsoft.com/office/powerpoint/2015/main" val="1"/>
+              </p:ext>
+            </p:extLst>
+          </p:nvPr>
+        </p:nvSpPr>
+        <p:spPr>
+          <a:xfrm>
+            <a:off x="3175" y="6400800"/>
+            <a:ext cx="12188825" cy="457200"/>
+          </a:xfrm>
+          <a:prstGeom prst="rect">
+            <a:avLst/>
+          </a:prstGeom>
+          <a:solidFill>
+            <a:schemeClr val="accent2"/>
+          </a:solidFill>
+          <a:ln>
+            <a:noFill/>
+          </a:ln>
+        </p:spPr>
+        <p:style>
+          <a:lnRef idx="2">
+            <a:schemeClr val="accent1">
+              <a:shade val="50000"/>
+            </a:schemeClr>
+          </a:lnRef>
+          <a:fillRef idx="1">
+            <a:schemeClr val="accent1"/>
+          </a:fillRef>
+          <a:effectRef idx="0">
+            <a:schemeClr val="accent1"/>
+          </a:effectRef>
+          <a:fontRef idx="minor">
+            <a:schemeClr val="lt1"/>
+          </a:fontRef>
+        </p:style>
+      </p:sp>
+      <p:sp>
+        <p:nvSpPr>
+          <p:cNvPr id="10" name="Rectangle 9">
+            <a:extLst>
+              <a:ext uri="{FF2B5EF4-FFF2-40B4-BE49-F238E27FC236}">
+                <a16:creationId xmlns:a16="http://schemas.microsoft.com/office/drawing/2014/main" id="{7D2256B4-48EA-40FC-BBC0-AA1EE6E0080C}"/>
+              </a:ext>
+              <a:ext uri="{C183D7F6-B498-43B3-948B-1728B52AA6E4}">
+                <adec:decorative xmlns:adec="http://schemas.microsoft.com/office/drawing/2017/decorative" val="1"/>
+              </a:ext>
+            </a:extLst>
+          </p:cNvPr>
+          <p:cNvSpPr>
+            <a:spLocks noGrp="1" noRot="1" noChangeAspect="1" noMove="1" noResize="1" noEditPoints="1" noAdjustHandles="1" noChangeArrowheads="1" noChangeShapeType="1" noTextEdit="1"/>
+          </p:cNvSpPr>
+          <p:nvPr>
+            <p:extLst>
+              <p:ext uri="{386F3935-93C4-4BCD-93E2-E3B085C9AB24}">
+                <p16:designElem xmlns:p16="http://schemas.microsoft.com/office/powerpoint/2015/main" val="1"/>
+              </p:ext>
+            </p:extLst>
+          </p:nvPr>
+        </p:nvSpPr>
+        <p:spPr>
+          <a:xfrm>
+            <a:off x="15" y="6334316"/>
+            <a:ext cx="12188825" cy="64008"/>
+          </a:xfrm>
+          <a:prstGeom prst="rect">
+            <a:avLst/>
+          </a:prstGeom>
+          <a:solidFill>
+            <a:schemeClr val="accent1"/>
+          </a:solidFill>
+          <a:ln>
+            <a:noFill/>
+          </a:ln>
+        </p:spPr>
+        <p:style>
+          <a:lnRef idx="2">
+            <a:schemeClr val="accent1">
+              <a:shade val="50000"/>
+            </a:schemeClr>
+          </a:lnRef>
+          <a:fillRef idx="1">
+            <a:schemeClr val="accent1"/>
+          </a:fillRef>
+          <a:effectRef idx="0">
+            <a:schemeClr val="accent1"/>
+          </a:effectRef>
+          <a:fontRef idx="minor">
+            <a:schemeClr val="lt1"/>
+          </a:fontRef>
+        </p:style>
+      </p:sp>
+      <p:cxnSp>
+        <p:nvCxnSpPr>
+          <p:cNvPr id="12" name="Straight Connector 11">
+            <a:extLst>
+              <a:ext uri="{FF2B5EF4-FFF2-40B4-BE49-F238E27FC236}">
+                <a16:creationId xmlns:a16="http://schemas.microsoft.com/office/drawing/2014/main" id="{3D44BCCA-102D-4A9D-B1E4-2450CAF0B05E}"/>
+              </a:ext>
+              <a:ext uri="{C183D7F6-B498-43B3-948B-1728B52AA6E4}">
+                <adec:decorative xmlns:adec="http://schemas.microsoft.com/office/drawing/2017/decorative" val="1"/>
+              </a:ext>
+            </a:extLst>
+          </p:cNvPr>
+          <p:cNvCxnSpPr>
+            <a:cxnSpLocks noGrp="1" noRot="1" noChangeAspect="1" noMove="1" noResize="1" noEditPoints="1" noAdjustHandles="1" noChangeArrowheads="1" noChangeShapeType="1"/>
+          </p:cNvCxnSpPr>
+          <p:nvPr>
+            <p:extLst>
+              <p:ext uri="{386F3935-93C4-4BCD-93E2-E3B085C9AB24}">
+                <p16:designElem xmlns:p16="http://schemas.microsoft.com/office/powerpoint/2015/main" val="1"/>
+              </p:ext>
+            </p:extLst>
+          </p:nvPr>
+        </p:nvCxnSpPr>
+        <p:spPr>
+          <a:xfrm>
+            <a:off x="1207658" y="4343400"/>
+            <a:ext cx="9875520" cy="0"/>
+          </a:xfrm>
+          <a:prstGeom prst="line">
+            <a:avLst/>
+          </a:prstGeom>
+          <a:ln w="6350">
+            <a:solidFill>
+              <a:schemeClr val="tx1">
+                <a:lumMod val="50000"/>
+                <a:lumOff val="50000"/>
+              </a:schemeClr>
+            </a:solidFill>
+          </a:ln>
+        </p:spPr>
+        <p:style>
+          <a:lnRef idx="1">
+            <a:schemeClr val="accent1"/>
+          </a:lnRef>
+          <a:fillRef idx="0">
+            <a:schemeClr val="accent1"/>
+          </a:fillRef>
+          <a:effectRef idx="0">
+            <a:schemeClr val="accent1"/>
+          </a:effectRef>
+          <a:fontRef idx="minor">
+            <a:schemeClr val="tx1"/>
+          </a:fontRef>
+        </p:style>
+      </p:cxnSp>
+      <p:sp useBgFill="1">
+        <p:nvSpPr>
+          <p:cNvPr id="14" name="Rectangle 13">
+            <a:extLst>
+              <a:ext uri="{FF2B5EF4-FFF2-40B4-BE49-F238E27FC236}">
+                <a16:creationId xmlns:a16="http://schemas.microsoft.com/office/drawing/2014/main" id="{FBDCECDC-EEE3-4128-AA5E-82A8C08796E8}"/>
+              </a:ext>
+              <a:ext uri="{C183D7F6-B498-43B3-948B-1728B52AA6E4}">
+                <adec:decorative xmlns:adec="http://schemas.microsoft.com/office/drawing/2017/decorative" val="1"/>
+              </a:ext>
+            </a:extLst>
+          </p:cNvPr>
+          <p:cNvSpPr>
+            <a:spLocks noGrp="1" noRot="1" noChangeAspect="1" noMove="1" noResize="1" noEditPoints="1" noAdjustHandles="1" noChangeArrowheads="1" noChangeShapeType="1" noTextEdit="1"/>
+          </p:cNvSpPr>
+          <p:nvPr>
+            <p:extLst>
+              <p:ext uri="{386F3935-93C4-4BCD-93E2-E3B085C9AB24}">
+                <p16:designElem xmlns:p16="http://schemas.microsoft.com/office/powerpoint/2015/main" val="1"/>
+              </p:ext>
+            </p:extLst>
+          </p:nvPr>
+        </p:nvSpPr>
+        <p:spPr>
+          <a:xfrm>
+            <a:off x="1507" y="0"/>
+            <a:ext cx="12192000" cy="6858000"/>
+          </a:xfrm>
+          <a:prstGeom prst="rect">
+            <a:avLst/>
+          </a:prstGeom>
+          <a:ln>
+            <a:noFill/>
+          </a:ln>
+        </p:spPr>
+        <p:style>
+          <a:lnRef idx="2">
+            <a:schemeClr val="accent1">
+              <a:shade val="50000"/>
+            </a:schemeClr>
+          </a:lnRef>
+          <a:fillRef idx="1">
+            <a:schemeClr val="accent1"/>
+          </a:fillRef>
+          <a:effectRef idx="0">
+            <a:schemeClr val="accent1"/>
+          </a:effectRef>
+          <a:fontRef idx="minor">
+            <a:schemeClr val="lt1"/>
+          </a:fontRef>
+        </p:style>
+        <p:txBody>
+          <a:bodyPr rtlCol="0" anchor="ctr"/>
+          <a:lstStyle/>
+          <a:p>
+            <a:pPr algn="ctr"/>
+            <a:endParaRPr lang="en-US"/>
+          </a:p>
+        </p:txBody>
+      </p:sp>
+      <p:sp>
+        <p:nvSpPr>
+          <p:cNvPr id="16" name="Rectangle 15">
+            <a:extLst>
+              <a:ext uri="{FF2B5EF4-FFF2-40B4-BE49-F238E27FC236}">
+                <a16:creationId xmlns:a16="http://schemas.microsoft.com/office/drawing/2014/main" id="{4260EDE0-989C-4E16-AF94-F652294D828E}"/>
+              </a:ext>
+              <a:ext uri="{C183D7F6-B498-43B3-948B-1728B52AA6E4}">
+                <adec:decorative xmlns:adec="http://schemas.microsoft.com/office/drawing/2017/decorative" val="1"/>
+              </a:ext>
+            </a:extLst>
+          </p:cNvPr>
+          <p:cNvSpPr>
+            <a:spLocks noGrp="1" noRot="1" noChangeAspect="1" noMove="1" noResize="1" noEditPoints="1" noAdjustHandles="1" noChangeArrowheads="1" noChangeShapeType="1" noTextEdit="1"/>
+          </p:cNvSpPr>
+          <p:nvPr>
+            <p:extLst>
+              <p:ext uri="{386F3935-93C4-4BCD-93E2-E3B085C9AB24}">
+                <p16:designElem xmlns:p16="http://schemas.microsoft.com/office/powerpoint/2015/main" val="1"/>
+              </p:ext>
+            </p:extLst>
+          </p:nvPr>
+        </p:nvSpPr>
+        <p:spPr bwMode="white">
+          <a:xfrm>
+            <a:off x="1507" y="4953000"/>
+            <a:ext cx="12188952" cy="1905000"/>
+          </a:xfrm>
+          <a:prstGeom prst="rect">
+            <a:avLst/>
+          </a:prstGeom>
+          <a:solidFill>
+            <a:schemeClr val="accent2"/>
+          </a:solidFill>
+          <a:ln>
+            <a:noFill/>
+          </a:ln>
+        </p:spPr>
+        <p:style>
+          <a:lnRef idx="2">
+            <a:schemeClr val="accent1">
+              <a:shade val="50000"/>
+            </a:schemeClr>
+          </a:lnRef>
+          <a:fillRef idx="1">
+            <a:schemeClr val="accent1"/>
+          </a:fillRef>
+          <a:effectRef idx="0">
+            <a:schemeClr val="accent1"/>
+          </a:effectRef>
+          <a:fontRef idx="minor">
+            <a:schemeClr val="lt1"/>
+          </a:fontRef>
+        </p:style>
+      </p:sp>
+      <p:sp>
+        <p:nvSpPr>
+          <p:cNvPr id="18" name="Rectangle 17">
+            <a:extLst>
+              <a:ext uri="{FF2B5EF4-FFF2-40B4-BE49-F238E27FC236}">
+                <a16:creationId xmlns:a16="http://schemas.microsoft.com/office/drawing/2014/main" id="{1F3985C0-E548-44D2-B30E-F3E42DADE133}"/>
+              </a:ext>
+              <a:ext uri="{C183D7F6-B498-43B3-948B-1728B52AA6E4}">
+                <adec:decorative xmlns:adec="http://schemas.microsoft.com/office/drawing/2017/decorative" val="1"/>
+              </a:ext>
+            </a:extLst>
+          </p:cNvPr>
+          <p:cNvSpPr>
+            <a:spLocks noGrp="1" noRot="1" noChangeAspect="1" noMove="1" noResize="1" noEditPoints="1" noAdjustHandles="1" noChangeArrowheads="1" noChangeShapeType="1" noTextEdit="1"/>
+          </p:cNvSpPr>
+          <p:nvPr>
+            <p:extLst>
+              <p:ext uri="{386F3935-93C4-4BCD-93E2-E3B085C9AB24}">
+                <p16:designElem xmlns:p16="http://schemas.microsoft.com/office/powerpoint/2015/main" val="1"/>
+              </p:ext>
+            </p:extLst>
+          </p:nvPr>
+        </p:nvSpPr>
+        <p:spPr>
+          <a:xfrm>
+            <a:off x="1507" y="0"/>
+            <a:ext cx="12188952" cy="4970184"/>
+          </a:xfrm>
+          <a:prstGeom prst="rect">
+            <a:avLst/>
+          </a:prstGeom>
+          <a:solidFill>
+            <a:schemeClr val="accent1"/>
+          </a:solidFill>
+          <a:ln>
+            <a:noFill/>
+          </a:ln>
+        </p:spPr>
+        <p:style>
+          <a:lnRef idx="2">
+            <a:schemeClr val="accent1">
+              <a:shade val="50000"/>
+            </a:schemeClr>
+          </a:lnRef>
+          <a:fillRef idx="1">
+            <a:schemeClr val="accent1"/>
+          </a:fillRef>
+          <a:effectRef idx="0">
+            <a:schemeClr val="accent1"/>
+          </a:effectRef>
+          <a:fontRef idx="minor">
+            <a:schemeClr val="lt1"/>
+          </a:fontRef>
+        </p:style>
+      </p:sp>
+      <p:sp>
+        <p:nvSpPr>
           <p:cNvPr id="2" name="Title 1">
             <a:extLst>
               <a:ext uri="{FF2B5EF4-FFF2-40B4-BE49-F238E27FC236}">
-                <a16:creationId xmlns:a16="http://schemas.microsoft.com/office/drawing/2014/main" id="{BB2E1A13-B8B3-4BAF-8E81-C9046D13C1A7}"/>
+                <a16:creationId xmlns:a16="http://schemas.microsoft.com/office/drawing/2014/main" id="{2FC66079-B227-4094-A064-1932D0D52CFD}"/>
               </a:ext>
             </a:extLst>
           </p:cNvPr>
@@ -9670,61 +13059,100 @@
             <p:ph type="title"/>
           </p:nvPr>
         </p:nvSpPr>
-        <p:spPr/>
+        <p:spPr>
+          <a:xfrm>
+            <a:off x="1097280" y="758952"/>
+            <a:ext cx="10058400" cy="3892168"/>
+          </a:xfrm>
+        </p:spPr>
         <p:txBody>
-          <a:bodyPr/>
+          <a:bodyPr vert="horz" lIns="91440" tIns="45720" rIns="91440" bIns="45720" rtlCol="0" anchor="b">
+            <a:normAutofit/>
+          </a:bodyPr>
           <a:lstStyle/>
           <a:p>
-            <a:r>
-              <a:rPr lang="en-US" dirty="0" err="1"/>
-              <a:t>Tổng</a:t>
-            </a:r>
-            <a:r>
-              <a:rPr lang="en-US" dirty="0"/>
+            <a:pPr algn="ctr"/>
+            <a:r>
+              <a:rPr lang="en-US" sz="8000" dirty="0" err="1"/>
+              <a:t>Cảm</a:t>
+            </a:r>
+            <a:r>
+              <a:rPr lang="en-US" sz="8000" dirty="0"/>
               <a:t> </a:t>
             </a:r>
             <a:r>
-              <a:rPr lang="en-US" dirty="0" err="1"/>
-              <a:t>kết</a:t>
-            </a:r>
-            <a:endParaRPr lang="en-US" dirty="0"/>
-          </a:p>
-        </p:txBody>
-      </p:sp>
-      <p:sp>
-        <p:nvSpPr>
-          <p:cNvPr id="3" name="Content Placeholder 2">
-            <a:extLst>
-              <a:ext uri="{FF2B5EF4-FFF2-40B4-BE49-F238E27FC236}">
-                <a16:creationId xmlns:a16="http://schemas.microsoft.com/office/drawing/2014/main" id="{DF5908D3-08A9-492E-AFDE-8FD353524A3C}"/>
-              </a:ext>
-            </a:extLst>
-          </p:cNvPr>
-          <p:cNvSpPr>
-            <a:spLocks noGrp="1"/>
-          </p:cNvSpPr>
-          <p:nvPr>
-            <p:ph idx="1"/>
-          </p:nvPr>
-        </p:nvSpPr>
-        <p:spPr/>
-        <p:txBody>
-          <a:bodyPr/>
-          <a:lstStyle/>
-          <a:p>
-            <a:endParaRPr lang="en-US" dirty="0"/>
+              <a:rPr lang="en-US" sz="8000" dirty="0" err="1"/>
+              <a:t>ơn</a:t>
+            </a:r>
+            <a:r>
+              <a:rPr lang="en-US" sz="8000" dirty="0"/>
+              <a:t> </a:t>
+            </a:r>
+            <a:r>
+              <a:rPr lang="en-US" sz="8000" dirty="0" err="1"/>
+              <a:t>thầy</a:t>
+            </a:r>
+            <a:r>
+              <a:rPr lang="en-US" sz="8000" dirty="0"/>
+              <a:t> </a:t>
+            </a:r>
+            <a:r>
+              <a:rPr lang="en-US" sz="8000" dirty="0" err="1"/>
+              <a:t>và</a:t>
+            </a:r>
+            <a:r>
+              <a:rPr lang="en-US" sz="8000" dirty="0"/>
+              <a:t> </a:t>
+            </a:r>
+            <a:r>
+              <a:rPr lang="en-US" sz="8000" dirty="0" err="1"/>
+              <a:t>các</a:t>
+            </a:r>
+            <a:r>
+              <a:rPr lang="en-US" sz="8000" dirty="0"/>
+              <a:t> </a:t>
+            </a:r>
+            <a:r>
+              <a:rPr lang="en-US" sz="8000" dirty="0" err="1"/>
+              <a:t>bạn</a:t>
+            </a:r>
+            <a:r>
+              <a:rPr lang="en-US" sz="8000" dirty="0"/>
+              <a:t> </a:t>
+            </a:r>
+            <a:r>
+              <a:rPr lang="en-US" sz="8000" dirty="0" err="1"/>
+              <a:t>đã</a:t>
+            </a:r>
+            <a:r>
+              <a:rPr lang="en-US" sz="8000" dirty="0"/>
+              <a:t> </a:t>
+            </a:r>
+            <a:r>
+              <a:rPr lang="en-US" sz="8000" dirty="0" err="1"/>
+              <a:t>lắng</a:t>
+            </a:r>
+            <a:r>
+              <a:rPr lang="en-US" sz="8000" dirty="0"/>
+              <a:t> </a:t>
+            </a:r>
+            <a:r>
+              <a:rPr lang="en-US" sz="8000" dirty="0" err="1"/>
+              <a:t>nghe</a:t>
+            </a:r>
+            <a:endParaRPr lang="en-US" sz="8000" dirty="0"/>
           </a:p>
         </p:txBody>
       </p:sp>
     </p:spTree>
     <p:extLst>
       <p:ext uri="{BB962C8B-B14F-4D97-AF65-F5344CB8AC3E}">
-        <p14:creationId xmlns:p14="http://schemas.microsoft.com/office/powerpoint/2010/main" val="3195975186"/>
+        <p14:creationId xmlns:p14="http://schemas.microsoft.com/office/powerpoint/2010/main" val="2121250180"/>
       </p:ext>
     </p:extLst>
   </p:cSld>
   <p:clrMapOvr>
-    <a:masterClrMapping/>
+    <a:overrideClrMapping bg1="dk1" tx1="lt1" bg2="dk2" tx2="lt2" accent1="accent1" accent2="accent2" accent3="accent3" accent4="accent4" accent5="accent5" accent6="accent6" hlink="hlink" folHlink="folHlink"/>
   </p:clrMapOvr>
 </p:sld>
 </file>
@@ -13656,15 +17084,6 @@
 </file>
 
 <file path=customXml/item1.xml><?xml version="1.0" encoding="utf-8"?>
-<?mso-contentType ?>
-<FormTemplates xmlns="http://schemas.microsoft.com/sharepoint/v3/contenttype/forms">
-  <Display>DocumentLibraryForm</Display>
-  <Edit>DocumentLibraryForm</Edit>
-  <New>DocumentLibraryForm</New>
-</FormTemplates>
-</file>
-
-<file path=customXml/item2.xml><?xml version="1.0" encoding="utf-8"?>
 <ct:contentTypeSchema xmlns:ct="http://schemas.microsoft.com/office/2006/metadata/contentType" xmlns:ma="http://schemas.microsoft.com/office/2006/metadata/properties/metaAttributes" ct:_="" ma:_="" ma:contentTypeName="Document" ma:contentTypeID="0x010100C91CA3E1E9EE134C9918035FFFC3873A" ma:contentTypeVersion="5" ma:contentTypeDescription="Create a new document." ma:contentTypeScope="" ma:versionID="10822c39c777e841f47cdeb9e31906b5">
   <xsd:schema xmlns:xsd="http://www.w3.org/2001/XMLSchema" xmlns:xs="http://www.w3.org/2001/XMLSchema" xmlns:p="http://schemas.microsoft.com/office/2006/metadata/properties" xmlns:ns3="8ef90a37-8bab-4b79-ac24-d1e1954b5bc3" xmlns:ns4="4134e186-385e-4be1-863c-e59af13540bd" targetNamespace="http://schemas.microsoft.com/office/2006/metadata/properties" ma:root="true" ma:fieldsID="610f1a945900e20bc5cb149b2f01cec5" ns3:_="" ns4:_="">
     <xsd:import namespace="8ef90a37-8bab-4b79-ac24-d1e1954b5bc3"/>
@@ -13835,6 +17254,15 @@
 </ct:contentTypeSchema>
 </file>
 
+<file path=customXml/item2.xml><?xml version="1.0" encoding="utf-8"?>
+<?mso-contentType ?>
+<FormTemplates xmlns="http://schemas.microsoft.com/sharepoint/v3/contenttype/forms">
+  <Display>DocumentLibraryForm</Display>
+  <Edit>DocumentLibraryForm</Edit>
+  <New>DocumentLibraryForm</New>
+</FormTemplates>
+</file>
+
 <file path=customXml/item3.xml><?xml version="1.0" encoding="utf-8"?>
 <p:properties xmlns:p="http://schemas.microsoft.com/office/2006/metadata/properties" xmlns:xsi="http://www.w3.org/2001/XMLSchema-instance" xmlns:pc="http://schemas.microsoft.com/office/infopath/2007/PartnerControls">
   <documentManagement/>
@@ -13842,14 +17270,6 @@
 </file>
 
 <file path=customXml/itemProps1.xml><?xml version="1.0" encoding="utf-8"?>
-<ds:datastoreItem xmlns:ds="http://schemas.openxmlformats.org/officeDocument/2006/customXml" ds:itemID="{CCAD78BF-9E94-44F6-9056-10B7D0436B5C}">
-  <ds:schemaRefs>
-    <ds:schemaRef ds:uri="http://schemas.microsoft.com/sharepoint/v3/contenttype/forms"/>
-  </ds:schemaRefs>
-</ds:datastoreItem>
-</file>
-
-<file path=customXml/itemProps2.xml><?xml version="1.0" encoding="utf-8"?>
 <ds:datastoreItem xmlns:ds="http://schemas.openxmlformats.org/officeDocument/2006/customXml" ds:itemID="{28936AA7-E0DF-4577-837E-4B01958A81B9}">
   <ds:schemaRefs>
     <ds:schemaRef ds:uri="http://schemas.microsoft.com/office/2006/metadata/contentType"/>
@@ -13864,6 +17284,14 @@
     <ds:schemaRef ds:uri="http://purl.org/dc/elements/1.1/"/>
     <ds:schemaRef ds:uri="http://purl.org/dc/terms/"/>
     <ds:schemaRef ds:uri="http://schemas.microsoft.com/internal/obd"/>
+  </ds:schemaRefs>
+</ds:datastoreItem>
+</file>
+
+<file path=customXml/itemProps2.xml><?xml version="1.0" encoding="utf-8"?>
+<ds:datastoreItem xmlns:ds="http://schemas.openxmlformats.org/officeDocument/2006/customXml" ds:itemID="{CCAD78BF-9E94-44F6-9056-10B7D0436B5C}">
+  <ds:schemaRefs>
+    <ds:schemaRef ds:uri="http://schemas.microsoft.com/sharepoint/v3/contenttype/forms"/>
   </ds:schemaRefs>
 </ds:datastoreItem>
 </file>

</xml_diff>